<commit_message>
Actualizacion charla sindrome del impostor
</commit_message>
<xml_diff>
--- a/17 - El síndrome del impostor - Mision TIC/sindrome_impostor_sabelotodo_u_obsoleto_MinTIC2021.pptx
+++ b/17 - El síndrome del impostor - Mision TIC/sindrome_impostor_sabelotodo_u_obsoleto_MinTIC2021.pptx
@@ -15,12 +15,19 @@
     <p:sldId id="268" r:id="rId9"/>
     <p:sldId id="269" r:id="rId10"/>
     <p:sldId id="270" r:id="rId11"/>
-    <p:sldId id="265" r:id="rId12"/>
-    <p:sldId id="272" r:id="rId13"/>
-    <p:sldId id="273" r:id="rId14"/>
-    <p:sldId id="274" r:id="rId15"/>
-    <p:sldId id="275" r:id="rId16"/>
-    <p:sldId id="258" r:id="rId17"/>
+    <p:sldId id="274" r:id="rId12"/>
+    <p:sldId id="275" r:id="rId13"/>
+    <p:sldId id="276" r:id="rId14"/>
+    <p:sldId id="279" r:id="rId15"/>
+    <p:sldId id="280" r:id="rId16"/>
+    <p:sldId id="282" r:id="rId17"/>
+    <p:sldId id="281" r:id="rId18"/>
+    <p:sldId id="272" r:id="rId19"/>
+    <p:sldId id="273" r:id="rId20"/>
+    <p:sldId id="278" r:id="rId21"/>
+    <p:sldId id="277" r:id="rId22"/>
+    <p:sldId id="265" r:id="rId23"/>
+    <p:sldId id="258" r:id="rId24"/>
   </p:sldIdLst>
   <p:sldSz cx="12192000" cy="6858000"/>
   <p:notesSz cx="6858000" cy="9144000"/>
@@ -1361,12 +1368,66 @@
           <a:chExt cx="0" cy="0"/>
         </a:xfrm>
       </p:grpSpPr>
+      <p:sp>
+        <p:nvSpPr>
+          <p:cNvPr id="2" name="CuadroTexto 1">
+            <a:extLst>
+              <a:ext uri="{FF2B5EF4-FFF2-40B4-BE49-F238E27FC236}">
+                <a16:creationId xmlns:a16="http://schemas.microsoft.com/office/drawing/2014/main" id="{D695FF5D-F46F-4540-B13D-1FF3FC2F9C1E}"/>
+              </a:ext>
+            </a:extLst>
+          </p:cNvPr>
+          <p:cNvSpPr txBox="1"/>
+          <p:nvPr/>
+        </p:nvSpPr>
+        <p:spPr>
+          <a:xfrm>
+            <a:off x="6096000" y="1905506"/>
+            <a:ext cx="4273360" cy="3046988"/>
+          </a:xfrm>
+          <a:prstGeom prst="rect">
+            <a:avLst/>
+          </a:prstGeom>
+          <a:noFill/>
+        </p:spPr>
+        <p:txBody>
+          <a:bodyPr wrap="square">
+            <a:spAutoFit/>
+          </a:bodyPr>
+          <a:lstStyle/>
+          <a:p>
+            <a:r>
+              <a:rPr lang="es-ES" sz="4800" b="1" dirty="0">
+                <a:ln w="19050">
+                  <a:solidFill>
+                    <a:srgbClr val="5C739C"/>
+                  </a:solidFill>
+                </a:ln>
+                <a:noFill/>
+                <a:latin typeface="Arial" panose="020B0604020202020204" pitchFamily="34" charset="0"/>
+                <a:cs typeface="Arial" panose="020B0604020202020204" pitchFamily="34" charset="0"/>
+              </a:rPr>
+              <a:t>¿Por qué se presenta el síndrome del impostor?</a:t>
+            </a:r>
+            <a:endParaRPr lang="es-CO" sz="4800" b="1" dirty="0">
+              <a:ln w="19050">
+                <a:solidFill>
+                  <a:srgbClr val="5C739C"/>
+                </a:solidFill>
+              </a:ln>
+              <a:noFill/>
+              <a:latin typeface="Arial" panose="020B0604020202020204" pitchFamily="34" charset="0"/>
+              <a:cs typeface="Arial" panose="020B0604020202020204" pitchFamily="34" charset="0"/>
+            </a:endParaRPr>
+          </a:p>
+        </p:txBody>
+      </p:sp>
       <p:pic>
         <p:nvPicPr>
           <p:cNvPr id="3" name="Imagen 2">
             <a:extLst>
               <a:ext uri="{FF2B5EF4-FFF2-40B4-BE49-F238E27FC236}">
-                <a16:creationId xmlns:a16="http://schemas.microsoft.com/office/drawing/2014/main" id="{E20F7241-857B-DE46-B3E2-EE0DFE01E99C}"/>
+                <a16:creationId xmlns:a16="http://schemas.microsoft.com/office/drawing/2014/main" id="{98B87EE2-8D31-41C7-865C-C252084F2734}"/>
               </a:ext>
             </a:extLst>
           </p:cNvPr>
@@ -1382,65 +1443,21 @@
           </a:stretch>
         </p:blipFill>
         <p:spPr>
-          <a:xfrm>
-            <a:off x="1558182" y="1620362"/>
-            <a:ext cx="205029" cy="173485"/>
+          <a:xfrm rot="16200000">
+            <a:off x="6050369" y="1674534"/>
+            <a:ext cx="571500" cy="152400"/>
           </a:xfrm>
           <a:prstGeom prst="rect">
             <a:avLst/>
           </a:prstGeom>
         </p:spPr>
       </p:pic>
-      <p:sp>
-        <p:nvSpPr>
-          <p:cNvPr id="12" name="CuadroTexto 11">
-            <a:extLst>
-              <a:ext uri="{FF2B5EF4-FFF2-40B4-BE49-F238E27FC236}">
-                <a16:creationId xmlns:a16="http://schemas.microsoft.com/office/drawing/2014/main" id="{DE1BFC59-8522-4823-A644-126DB6DF8625}"/>
-              </a:ext>
-            </a:extLst>
-          </p:cNvPr>
-          <p:cNvSpPr txBox="1"/>
-          <p:nvPr/>
-        </p:nvSpPr>
-        <p:spPr>
-          <a:xfrm>
-            <a:off x="2396282" y="-1988697"/>
-            <a:ext cx="1034522" cy="9248686"/>
-          </a:xfrm>
-          <a:prstGeom prst="rect">
-            <a:avLst/>
-          </a:prstGeom>
-          <a:noFill/>
-        </p:spPr>
-        <p:txBody>
-          <a:bodyPr wrap="square" rtlCol="0">
-            <a:spAutoFit/>
-          </a:bodyPr>
-          <a:lstStyle/>
-          <a:p>
-            <a:r>
-              <a:rPr lang="es-CO" sz="59500" b="1" dirty="0">
-                <a:ln w="19050">
-                  <a:solidFill>
-                    <a:srgbClr val="E83566"/>
-                  </a:solidFill>
-                </a:ln>
-                <a:noFill/>
-                <a:latin typeface="Arial" panose="020B0604020202020204" pitchFamily="34" charset="0"/>
-                <a:cs typeface="Arial" panose="020B0604020202020204" pitchFamily="34" charset="0"/>
-              </a:rPr>
-              <a:t>V</a:t>
-            </a:r>
-          </a:p>
-        </p:txBody>
-      </p:sp>
       <p:pic>
         <p:nvPicPr>
-          <p:cNvPr id="5" name="Imagen 4">
-            <a:extLst>
-              <a:ext uri="{FF2B5EF4-FFF2-40B4-BE49-F238E27FC236}">
-                <a16:creationId xmlns:a16="http://schemas.microsoft.com/office/drawing/2014/main" id="{384C26ED-F65D-5D41-8438-47B783421CE5}"/>
+          <p:cNvPr id="5" name="Imagen 4" descr="Imagen que contiene persona, sostener, hombre, vistiendo&#10;&#10;Descripción generada automáticamente">
+            <a:extLst>
+              <a:ext uri="{FF2B5EF4-FFF2-40B4-BE49-F238E27FC236}">
+                <a16:creationId xmlns:a16="http://schemas.microsoft.com/office/drawing/2014/main" id="{02072560-7772-4BFA-A6C3-C038EEAA650E}"/>
               </a:ext>
             </a:extLst>
           </p:cNvPr>
@@ -1449,234 +1466,27 @@
           </p:cNvPicPr>
           <p:nvPr/>
         </p:nvPicPr>
-        <p:blipFill>
-          <a:blip r:embed="rId3"/>
-          <a:stretch>
-            <a:fillRect/>
-          </a:stretch>
+        <p:blipFill rotWithShape="1">
+          <a:blip r:embed="rId3">
+            <a:grayscl/>
+          </a:blip>
+          <a:srcRect l="22069" r="22573"/>
+          <a:stretch/>
         </p:blipFill>
         <p:spPr>
           <a:xfrm>
-            <a:off x="846235" y="6171028"/>
-            <a:ext cx="571500" cy="152400"/>
+            <a:off x="3612444" y="1819275"/>
+            <a:ext cx="2483556" cy="5038725"/>
           </a:xfrm>
           <a:prstGeom prst="rect">
             <a:avLst/>
           </a:prstGeom>
         </p:spPr>
       </p:pic>
-      <p:sp>
-        <p:nvSpPr>
-          <p:cNvPr id="14" name="CuadroTexto 13">
-            <a:extLst>
-              <a:ext uri="{FF2B5EF4-FFF2-40B4-BE49-F238E27FC236}">
-                <a16:creationId xmlns:a16="http://schemas.microsoft.com/office/drawing/2014/main" id="{5D3F11D2-D3D3-4D6A-A426-567CD1B6E0D8}"/>
-              </a:ext>
-            </a:extLst>
-          </p:cNvPr>
-          <p:cNvSpPr txBox="1"/>
-          <p:nvPr/>
-        </p:nvSpPr>
-        <p:spPr>
-          <a:xfrm>
-            <a:off x="5385872" y="1444401"/>
-            <a:ext cx="3329149" cy="2554545"/>
-          </a:xfrm>
-          <a:prstGeom prst="rect">
-            <a:avLst/>
-          </a:prstGeom>
-          <a:noFill/>
-        </p:spPr>
-        <p:txBody>
-          <a:bodyPr wrap="square" rtlCol="0">
-            <a:spAutoFit/>
-          </a:bodyPr>
-          <a:lstStyle/>
-          <a:p>
-            <a:r>
-              <a:rPr lang="es-CO" sz="4000" b="1" dirty="0">
-                <a:solidFill>
-                  <a:schemeClr val="accent1"/>
-                </a:solidFill>
-                <a:latin typeface="Arial" panose="020B0604020202020204" pitchFamily="34" charset="0"/>
-                <a:cs typeface="Arial" panose="020B0604020202020204" pitchFamily="34" charset="0"/>
-              </a:rPr>
-              <a:t>Vísteme despacio que tengo prisa</a:t>
-            </a:r>
-          </a:p>
-        </p:txBody>
-      </p:sp>
-      <p:sp>
-        <p:nvSpPr>
-          <p:cNvPr id="15" name="CuadroTexto 14">
-            <a:extLst>
-              <a:ext uri="{FF2B5EF4-FFF2-40B4-BE49-F238E27FC236}">
-                <a16:creationId xmlns:a16="http://schemas.microsoft.com/office/drawing/2014/main" id="{9614F4AF-E1D5-43C5-876F-CA4497D0EA8C}"/>
-              </a:ext>
-            </a:extLst>
-          </p:cNvPr>
-          <p:cNvSpPr txBox="1"/>
-          <p:nvPr/>
-        </p:nvSpPr>
-        <p:spPr>
-          <a:xfrm>
-            <a:off x="6596595" y="468684"/>
-            <a:ext cx="940482" cy="5276410"/>
-          </a:xfrm>
-          <a:prstGeom prst="rect">
-            <a:avLst/>
-          </a:prstGeom>
-          <a:noFill/>
-        </p:spPr>
-        <p:txBody>
-          <a:bodyPr wrap="square" rtlCol="0">
-            <a:spAutoFit/>
-          </a:bodyPr>
-          <a:lstStyle/>
-          <a:p>
-            <a:r>
-              <a:rPr lang="es-CO" sz="49600" b="1" dirty="0">
-                <a:ln w="19050">
-                  <a:solidFill>
-                    <a:srgbClr val="5C739C"/>
-                  </a:solidFill>
-                </a:ln>
-                <a:noFill/>
-                <a:latin typeface="Arial" panose="020B0604020202020204" pitchFamily="34" charset="0"/>
-                <a:cs typeface="Arial" panose="020B0604020202020204" pitchFamily="34" charset="0"/>
-              </a:rPr>
-              <a:t>A</a:t>
-            </a:r>
-          </a:p>
-        </p:txBody>
-      </p:sp>
-      <p:sp>
-        <p:nvSpPr>
-          <p:cNvPr id="16" name="CuadroTexto 15">
-            <a:extLst>
-              <a:ext uri="{FF2B5EF4-FFF2-40B4-BE49-F238E27FC236}">
-                <a16:creationId xmlns:a16="http://schemas.microsoft.com/office/drawing/2014/main" id="{528026C5-D934-461B-A360-77CF416FBA92}"/>
-              </a:ext>
-            </a:extLst>
-          </p:cNvPr>
-          <p:cNvSpPr txBox="1"/>
-          <p:nvPr/>
-        </p:nvSpPr>
-        <p:spPr>
-          <a:xfrm>
-            <a:off x="9082356" y="2959612"/>
-            <a:ext cx="3329149" cy="1323439"/>
-          </a:xfrm>
-          <a:prstGeom prst="rect">
-            <a:avLst/>
-          </a:prstGeom>
-          <a:noFill/>
-        </p:spPr>
-        <p:txBody>
-          <a:bodyPr wrap="square" rtlCol="0">
-            <a:spAutoFit/>
-          </a:bodyPr>
-          <a:lstStyle/>
-          <a:p>
-            <a:r>
-              <a:rPr lang="es-CO" sz="4000" b="1" dirty="0">
-                <a:ln>
-                  <a:solidFill>
-                    <a:srgbClr val="E83566"/>
-                  </a:solidFill>
-                </a:ln>
-                <a:noFill/>
-                <a:latin typeface="Arial" panose="020B0604020202020204" pitchFamily="34" charset="0"/>
-                <a:cs typeface="Arial" panose="020B0604020202020204" pitchFamily="34" charset="0"/>
-              </a:rPr>
-              <a:t>Apresúrate</a:t>
-            </a:r>
-          </a:p>
-          <a:p>
-            <a:r>
-              <a:rPr lang="es-CO" sz="4000" b="1" dirty="0">
-                <a:ln>
-                  <a:solidFill>
-                    <a:srgbClr val="E83566"/>
-                  </a:solidFill>
-                </a:ln>
-                <a:noFill/>
-                <a:latin typeface="Arial" panose="020B0604020202020204" pitchFamily="34" charset="0"/>
-                <a:cs typeface="Arial" panose="020B0604020202020204" pitchFamily="34" charset="0"/>
-              </a:rPr>
-              <a:t>lentamente</a:t>
-            </a:r>
-          </a:p>
-        </p:txBody>
-      </p:sp>
-      <p:sp>
-        <p:nvSpPr>
-          <p:cNvPr id="18" name="CuadroTexto 17">
-            <a:extLst>
-              <a:ext uri="{FF2B5EF4-FFF2-40B4-BE49-F238E27FC236}">
-                <a16:creationId xmlns:a16="http://schemas.microsoft.com/office/drawing/2014/main" id="{F66E8033-1A02-4265-AF6C-CF9FE730E20E}"/>
-              </a:ext>
-            </a:extLst>
-          </p:cNvPr>
-          <p:cNvSpPr txBox="1"/>
-          <p:nvPr/>
-        </p:nvSpPr>
-        <p:spPr>
-          <a:xfrm>
-            <a:off x="1448520" y="6062562"/>
-            <a:ext cx="8347198" cy="369332"/>
-          </a:xfrm>
-          <a:prstGeom prst="rect">
-            <a:avLst/>
-          </a:prstGeom>
-          <a:noFill/>
-        </p:spPr>
-        <p:txBody>
-          <a:bodyPr wrap="square">
-            <a:spAutoFit/>
-          </a:bodyPr>
-          <a:lstStyle/>
-          <a:p>
-            <a:r>
-              <a:rPr lang="es-CO" dirty="0">
-                <a:solidFill>
-                  <a:schemeClr val="bg2">
-                    <a:lumMod val="50000"/>
-                  </a:schemeClr>
-                </a:solidFill>
-                <a:latin typeface="Arial" panose="020B0604020202020204" pitchFamily="34" charset="0"/>
-                <a:cs typeface="Arial" panose="020B0604020202020204" pitchFamily="34" charset="0"/>
-              </a:rPr>
-              <a:t>“</a:t>
-            </a:r>
-            <a:r>
-              <a:rPr lang="es-ES" dirty="0">
-                <a:solidFill>
-                  <a:schemeClr val="bg2">
-                    <a:lumMod val="50000"/>
-                  </a:schemeClr>
-                </a:solidFill>
-                <a:latin typeface="Arial" panose="020B0604020202020204" pitchFamily="34" charset="0"/>
-                <a:cs typeface="Arial" panose="020B0604020202020204" pitchFamily="34" charset="0"/>
-              </a:rPr>
-              <a:t>Caminad lentamente si queréis llegar más pronto a un trabajo bien hecho”</a:t>
-            </a:r>
-            <a:endParaRPr lang="es-CO" dirty="0">
-              <a:solidFill>
-                <a:schemeClr val="bg2">
-                  <a:lumMod val="50000"/>
-                </a:schemeClr>
-              </a:solidFill>
-              <a:latin typeface="Arial" panose="020B0604020202020204" pitchFamily="34" charset="0"/>
-              <a:cs typeface="Arial" panose="020B0604020202020204" pitchFamily="34" charset="0"/>
-            </a:endParaRPr>
-          </a:p>
-        </p:txBody>
-      </p:sp>
     </p:spTree>
     <p:extLst>
       <p:ext uri="{BB962C8B-B14F-4D97-AF65-F5344CB8AC3E}">
-        <p14:creationId xmlns:p14="http://schemas.microsoft.com/office/powerpoint/2010/main" val="2874538529"/>
+        <p14:creationId xmlns:p14="http://schemas.microsoft.com/office/powerpoint/2010/main" val="1625820414"/>
       </p:ext>
     </p:extLst>
   </p:cSld>
@@ -1705,10 +1515,10 @@
       </p:grpSpPr>
       <p:pic>
         <p:nvPicPr>
-          <p:cNvPr id="5" name="Imagen 4">
-            <a:extLst>
-              <a:ext uri="{FF2B5EF4-FFF2-40B4-BE49-F238E27FC236}">
-                <a16:creationId xmlns:a16="http://schemas.microsoft.com/office/drawing/2014/main" id="{384C26ED-F65D-5D41-8438-47B783421CE5}"/>
+          <p:cNvPr id="21" name="Imagen 20">
+            <a:extLst>
+              <a:ext uri="{FF2B5EF4-FFF2-40B4-BE49-F238E27FC236}">
+                <a16:creationId xmlns:a16="http://schemas.microsoft.com/office/drawing/2014/main" id="{F0ECDF9F-21EA-4E76-AAAD-DDF43417F80C}"/>
               </a:ext>
             </a:extLst>
           </p:cNvPr>
@@ -1724,19 +1534,295 @@
           </a:stretch>
         </p:blipFill>
         <p:spPr>
-          <a:xfrm rot="16200000">
-            <a:off x="10203234" y="1219202"/>
-            <a:ext cx="571500" cy="152400"/>
+          <a:xfrm>
+            <a:off x="2536563" y="2348657"/>
+            <a:ext cx="205029" cy="173485"/>
           </a:xfrm>
           <a:prstGeom prst="rect">
             <a:avLst/>
           </a:prstGeom>
         </p:spPr>
       </p:pic>
+      <p:sp>
+        <p:nvSpPr>
+          <p:cNvPr id="4" name="CuadroTexto 3">
+            <a:extLst>
+              <a:ext uri="{FF2B5EF4-FFF2-40B4-BE49-F238E27FC236}">
+                <a16:creationId xmlns:a16="http://schemas.microsoft.com/office/drawing/2014/main" id="{800AF770-00E7-4DD9-A033-9A4917732086}"/>
+              </a:ext>
+            </a:extLst>
+          </p:cNvPr>
+          <p:cNvSpPr txBox="1"/>
+          <p:nvPr/>
+        </p:nvSpPr>
+        <p:spPr>
+          <a:xfrm>
+            <a:off x="2741592" y="2219955"/>
+            <a:ext cx="2564186" cy="430887"/>
+          </a:xfrm>
+          <a:prstGeom prst="rect">
+            <a:avLst/>
+          </a:prstGeom>
+          <a:noFill/>
+        </p:spPr>
+        <p:txBody>
+          <a:bodyPr wrap="square" rtlCol="0">
+            <a:spAutoFit/>
+          </a:bodyPr>
+          <a:lstStyle/>
+          <a:p>
+            <a:r>
+              <a:rPr lang="es-CO" sz="2200" b="1" dirty="0">
+                <a:solidFill>
+                  <a:schemeClr val="accent1"/>
+                </a:solidFill>
+                <a:latin typeface="Arial" panose="020B0604020202020204" pitchFamily="34" charset="0"/>
+                <a:cs typeface="Arial" panose="020B0604020202020204" pitchFamily="34" charset="0"/>
+              </a:rPr>
+              <a:t>La deuda técnica</a:t>
+            </a:r>
+          </a:p>
+        </p:txBody>
+      </p:sp>
+      <p:sp>
+        <p:nvSpPr>
+          <p:cNvPr id="8" name="CuadroTexto 7">
+            <a:extLst>
+              <a:ext uri="{FF2B5EF4-FFF2-40B4-BE49-F238E27FC236}">
+                <a16:creationId xmlns:a16="http://schemas.microsoft.com/office/drawing/2014/main" id="{C00C852D-2242-462B-AEBC-AC3FB2D8ED1B}"/>
+              </a:ext>
+            </a:extLst>
+          </p:cNvPr>
+          <p:cNvSpPr txBox="1"/>
+          <p:nvPr/>
+        </p:nvSpPr>
+        <p:spPr>
+          <a:xfrm>
+            <a:off x="5305778" y="2219955"/>
+            <a:ext cx="3759200" cy="2031325"/>
+          </a:xfrm>
+          <a:prstGeom prst="rect">
+            <a:avLst/>
+          </a:prstGeom>
+          <a:noFill/>
+        </p:spPr>
+        <p:txBody>
+          <a:bodyPr wrap="square">
+            <a:spAutoFit/>
+          </a:bodyPr>
+          <a:lstStyle/>
+          <a:p>
+            <a:r>
+              <a:rPr lang="es-ES" dirty="0">
+                <a:solidFill>
+                  <a:schemeClr val="bg2">
+                    <a:lumMod val="25000"/>
+                  </a:schemeClr>
+                </a:solidFill>
+                <a:latin typeface="Arial" panose="020B0604020202020204" pitchFamily="34" charset="0"/>
+                <a:cs typeface="Arial" panose="020B0604020202020204" pitchFamily="34" charset="0"/>
+              </a:rPr>
+              <a:t>Es un concepto en el desarrollo de software que refleja el costo implícito del retrabajo adicional causado por elegir </a:t>
+            </a:r>
+            <a:r>
+              <a:rPr lang="es-ES" b="1" dirty="0">
+                <a:solidFill>
+                  <a:srgbClr val="E83566"/>
+                </a:solidFill>
+                <a:latin typeface="Arial" panose="020B0604020202020204" pitchFamily="34" charset="0"/>
+                <a:cs typeface="Arial" panose="020B0604020202020204" pitchFamily="34" charset="0"/>
+              </a:rPr>
+              <a:t>una solución fácil</a:t>
+            </a:r>
+            <a:r>
+              <a:rPr lang="es-ES" dirty="0">
+                <a:solidFill>
+                  <a:schemeClr val="bg2">
+                    <a:lumMod val="25000"/>
+                  </a:schemeClr>
+                </a:solidFill>
+                <a:latin typeface="Arial" panose="020B0604020202020204" pitchFamily="34" charset="0"/>
+                <a:cs typeface="Arial" panose="020B0604020202020204" pitchFamily="34" charset="0"/>
+              </a:rPr>
+              <a:t> en lugar de utilizar un enfoque que llevaría más tiempo en su desarrollo e implementación</a:t>
+            </a:r>
+            <a:endParaRPr lang="es-CO" dirty="0">
+              <a:solidFill>
+                <a:schemeClr val="bg2">
+                  <a:lumMod val="25000"/>
+                </a:schemeClr>
+              </a:solidFill>
+              <a:latin typeface="Arial" panose="020B0604020202020204" pitchFamily="34" charset="0"/>
+              <a:cs typeface="Arial" panose="020B0604020202020204" pitchFamily="34" charset="0"/>
+            </a:endParaRPr>
+          </a:p>
+        </p:txBody>
+      </p:sp>
+      <p:sp>
+        <p:nvSpPr>
+          <p:cNvPr id="10" name="CuadroTexto 9">
+            <a:extLst>
+              <a:ext uri="{FF2B5EF4-FFF2-40B4-BE49-F238E27FC236}">
+                <a16:creationId xmlns:a16="http://schemas.microsoft.com/office/drawing/2014/main" id="{E06752AF-9213-409E-9A79-5B0468EA86BB}"/>
+              </a:ext>
+            </a:extLst>
+          </p:cNvPr>
+          <p:cNvSpPr txBox="1"/>
+          <p:nvPr/>
+        </p:nvSpPr>
+        <p:spPr>
+          <a:xfrm>
+            <a:off x="666044" y="4379982"/>
+            <a:ext cx="4639734" cy="1477328"/>
+          </a:xfrm>
+          <a:prstGeom prst="rect">
+            <a:avLst/>
+          </a:prstGeom>
+          <a:noFill/>
+        </p:spPr>
+        <p:txBody>
+          <a:bodyPr wrap="square">
+            <a:spAutoFit/>
+          </a:bodyPr>
+          <a:lstStyle/>
+          <a:p>
+            <a:r>
+              <a:rPr lang="es-ES" dirty="0">
+                <a:solidFill>
+                  <a:schemeClr val="bg2">
+                    <a:lumMod val="50000"/>
+                  </a:schemeClr>
+                </a:solidFill>
+                <a:latin typeface="Arial" panose="020B0604020202020204" pitchFamily="34" charset="0"/>
+                <a:cs typeface="Arial" panose="020B0604020202020204" pitchFamily="34" charset="0"/>
+              </a:rPr>
+              <a:t>Falta de colaboración, donde el </a:t>
+            </a:r>
+            <a:r>
+              <a:rPr lang="es-ES" dirty="0">
+                <a:solidFill>
+                  <a:srgbClr val="E83566"/>
+                </a:solidFill>
+                <a:latin typeface="Arial" panose="020B0604020202020204" pitchFamily="34" charset="0"/>
+                <a:cs typeface="Arial" panose="020B0604020202020204" pitchFamily="34" charset="0"/>
+              </a:rPr>
+              <a:t>conocimiento no se comparte </a:t>
+            </a:r>
+            <a:r>
+              <a:rPr lang="es-ES" dirty="0">
+                <a:solidFill>
+                  <a:schemeClr val="bg2">
+                    <a:lumMod val="50000"/>
+                  </a:schemeClr>
+                </a:solidFill>
+                <a:latin typeface="Arial" panose="020B0604020202020204" pitchFamily="34" charset="0"/>
+                <a:cs typeface="Arial" panose="020B0604020202020204" pitchFamily="34" charset="0"/>
+              </a:rPr>
+              <a:t>alrededor de la organización y la eficiencia del negocio se ve afectada, o los desarrolladores junior no están debidamente orientados.</a:t>
+            </a:r>
+            <a:endParaRPr lang="es-CO" dirty="0">
+              <a:solidFill>
+                <a:schemeClr val="bg2">
+                  <a:lumMod val="50000"/>
+                </a:schemeClr>
+              </a:solidFill>
+              <a:latin typeface="Arial" panose="020B0604020202020204" pitchFamily="34" charset="0"/>
+              <a:cs typeface="Arial" panose="020B0604020202020204" pitchFamily="34" charset="0"/>
+            </a:endParaRPr>
+          </a:p>
+        </p:txBody>
+      </p:sp>
+      <p:pic>
+        <p:nvPicPr>
+          <p:cNvPr id="9" name="Imagen 8" descr="Un niño con raqueta de tenis&#10;&#10;Descripción generada automáticamente con confianza media">
+            <a:extLst>
+              <a:ext uri="{FF2B5EF4-FFF2-40B4-BE49-F238E27FC236}">
+                <a16:creationId xmlns:a16="http://schemas.microsoft.com/office/drawing/2014/main" id="{A49FDDD5-EB35-487B-A6C9-9E8632A0A50F}"/>
+              </a:ext>
+            </a:extLst>
+          </p:cNvPr>
+          <p:cNvPicPr>
+            <a:picLocks noChangeAspect="1"/>
+          </p:cNvPicPr>
+          <p:nvPr/>
+        </p:nvPicPr>
+        <p:blipFill rotWithShape="1">
+          <a:blip r:embed="rId3">
+            <a:grayscl/>
+            <a:alphaModFix amt="50000"/>
+            <a:extLst>
+              <a:ext uri="{BEBA8EAE-BF5A-486C-A8C5-ECC9F3942E4B}">
+                <a14:imgProps xmlns:a14="http://schemas.microsoft.com/office/drawing/2010/main">
+                  <a14:imgLayer r:embed="rId4">
+                    <a14:imgEffect>
+                      <a14:sharpenSoften amount="25000"/>
+                    </a14:imgEffect>
+                  </a14:imgLayer>
+                </a14:imgProps>
+              </a:ext>
+            </a:extLst>
+          </a:blip>
+          <a:srcRect l="20844" r="11600"/>
+          <a:stretch/>
+        </p:blipFill>
+        <p:spPr>
+          <a:xfrm>
+            <a:off x="8974666" y="1047750"/>
+            <a:ext cx="3217333" cy="4762500"/>
+          </a:xfrm>
+          <a:prstGeom prst="rect">
+            <a:avLst/>
+          </a:prstGeom>
+        </p:spPr>
+      </p:pic>
+      <p:sp>
+        <p:nvSpPr>
+          <p:cNvPr id="15" name="CuadroTexto 14">
+            <a:extLst>
+              <a:ext uri="{FF2B5EF4-FFF2-40B4-BE49-F238E27FC236}">
+                <a16:creationId xmlns:a16="http://schemas.microsoft.com/office/drawing/2014/main" id="{807FA9D8-8C1A-4573-95D0-8CC5F689CA53}"/>
+              </a:ext>
+            </a:extLst>
+          </p:cNvPr>
+          <p:cNvSpPr txBox="1"/>
+          <p:nvPr/>
+        </p:nvSpPr>
+        <p:spPr>
+          <a:xfrm>
+            <a:off x="3206043" y="6147336"/>
+            <a:ext cx="6096000" cy="338554"/>
+          </a:xfrm>
+          <a:prstGeom prst="rect">
+            <a:avLst/>
+          </a:prstGeom>
+          <a:noFill/>
+        </p:spPr>
+        <p:txBody>
+          <a:bodyPr wrap="square">
+            <a:spAutoFit/>
+          </a:bodyPr>
+          <a:lstStyle/>
+          <a:p>
+            <a:r>
+              <a:rPr lang="es-CO" sz="1600" dirty="0">
+                <a:solidFill>
+                  <a:schemeClr val="tx1">
+                    <a:lumMod val="85000"/>
+                    <a:lumOff val="15000"/>
+                  </a:schemeClr>
+                </a:solidFill>
+                <a:latin typeface="Cambria Math" panose="02040503050406030204" pitchFamily="18" charset="0"/>
+                <a:ea typeface="Cambria Math" panose="02040503050406030204" pitchFamily="18" charset="0"/>
+              </a:rPr>
+              <a:t>Créditos: https://es.wikipedia.org/wiki/Deuda_t%C3%A9cnica</a:t>
+            </a:r>
+          </a:p>
+        </p:txBody>
+      </p:sp>
     </p:spTree>
     <p:extLst>
       <p:ext uri="{BB962C8B-B14F-4D97-AF65-F5344CB8AC3E}">
-        <p14:creationId xmlns:p14="http://schemas.microsoft.com/office/powerpoint/2010/main" val="696006659"/>
+        <p14:creationId xmlns:p14="http://schemas.microsoft.com/office/powerpoint/2010/main" val="3588353348"/>
       </p:ext>
     </p:extLst>
   </p:cSld>
@@ -1763,12 +1849,66 @@
           <a:chExt cx="0" cy="0"/>
         </a:xfrm>
       </p:grpSpPr>
+      <p:sp>
+        <p:nvSpPr>
+          <p:cNvPr id="14" name="CuadroTexto 13">
+            <a:extLst>
+              <a:ext uri="{FF2B5EF4-FFF2-40B4-BE49-F238E27FC236}">
+                <a16:creationId xmlns:a16="http://schemas.microsoft.com/office/drawing/2014/main" id="{3E764585-5CEC-4D97-93DF-03FFBF2E05B4}"/>
+              </a:ext>
+            </a:extLst>
+          </p:cNvPr>
+          <p:cNvSpPr txBox="1"/>
+          <p:nvPr/>
+        </p:nvSpPr>
+        <p:spPr>
+          <a:xfrm>
+            <a:off x="3036711" y="6190479"/>
+            <a:ext cx="6062133" cy="338554"/>
+          </a:xfrm>
+          <a:prstGeom prst="rect">
+            <a:avLst/>
+          </a:prstGeom>
+          <a:noFill/>
+        </p:spPr>
+        <p:txBody>
+          <a:bodyPr wrap="square">
+            <a:spAutoFit/>
+          </a:bodyPr>
+          <a:lstStyle/>
+          <a:p>
+            <a:r>
+              <a:rPr lang="es-ES" sz="1600" dirty="0">
+                <a:solidFill>
+                  <a:schemeClr val="tx1">
+                    <a:lumMod val="85000"/>
+                    <a:lumOff val="15000"/>
+                  </a:schemeClr>
+                </a:solidFill>
+                <a:latin typeface="Cambria Math" panose="02040503050406030204" pitchFamily="18" charset="0"/>
+                <a:ea typeface="Cambria Math" panose="02040503050406030204" pitchFamily="18" charset="0"/>
+              </a:rPr>
+              <a:t>Créditos: https://github.com/kamranahmedse/developer-roadmap</a:t>
+            </a:r>
+            <a:endParaRPr lang="es-ES" sz="1600" b="1" dirty="0">
+              <a:solidFill>
+                <a:schemeClr val="tx1">
+                  <a:lumMod val="85000"/>
+                  <a:lumOff val="15000"/>
+                </a:schemeClr>
+              </a:solidFill>
+              <a:latin typeface="Cambria Math" panose="02040503050406030204" pitchFamily="18" charset="0"/>
+              <a:ea typeface="Cambria Math" panose="02040503050406030204" pitchFamily="18" charset="0"/>
+            </a:endParaRPr>
+          </a:p>
+        </p:txBody>
+      </p:sp>
       <p:pic>
         <p:nvPicPr>
-          <p:cNvPr id="5" name="Imagen 4">
-            <a:extLst>
-              <a:ext uri="{FF2B5EF4-FFF2-40B4-BE49-F238E27FC236}">
-                <a16:creationId xmlns:a16="http://schemas.microsoft.com/office/drawing/2014/main" id="{384C26ED-F65D-5D41-8438-47B783421CE5}"/>
+          <p:cNvPr id="3" name="Imagen 2" descr="Diagrama&#10;&#10;Descripción generada automáticamente">
+            <a:extLst>
+              <a:ext uri="{FF2B5EF4-FFF2-40B4-BE49-F238E27FC236}">
+                <a16:creationId xmlns:a16="http://schemas.microsoft.com/office/drawing/2014/main" id="{4C4FB4BB-158D-4409-9B2D-832C5B7E2B03}"/>
               </a:ext>
             </a:extLst>
           </p:cNvPr>
@@ -1778,55 +1918,185 @@
           <p:nvPr/>
         </p:nvPicPr>
         <p:blipFill>
-          <a:blip r:embed="rId2"/>
+          <a:blip r:embed="rId2">
+            <a:grayscl/>
+          </a:blip>
           <a:stretch>
             <a:fillRect/>
           </a:stretch>
         </p:blipFill>
         <p:spPr>
-          <a:xfrm rot="16200000">
-            <a:off x="10812834" y="1219202"/>
-            <a:ext cx="571500" cy="152400"/>
+          <a:xfrm>
+            <a:off x="347662" y="1744977"/>
+            <a:ext cx="11496675" cy="4152900"/>
           </a:xfrm>
           <a:prstGeom prst="rect">
             <a:avLst/>
           </a:prstGeom>
         </p:spPr>
       </p:pic>
-      <p:pic>
-        <p:nvPicPr>
-          <p:cNvPr id="19" name="Imagen 18">
-            <a:extLst>
-              <a:ext uri="{FF2B5EF4-FFF2-40B4-BE49-F238E27FC236}">
-                <a16:creationId xmlns:a16="http://schemas.microsoft.com/office/drawing/2014/main" id="{1B17433A-7D69-471E-B131-1E1813A6BCF6}"/>
-              </a:ext>
-            </a:extLst>
-          </p:cNvPr>
-          <p:cNvPicPr>
-            <a:picLocks noChangeAspect="1"/>
-          </p:cNvPicPr>
-          <p:nvPr/>
-        </p:nvPicPr>
-        <p:blipFill>
-          <a:blip r:embed="rId3"/>
-          <a:stretch>
-            <a:fillRect/>
-          </a:stretch>
-        </p:blipFill>
-        <p:spPr>
-          <a:xfrm>
-            <a:off x="4770975" y="708925"/>
-            <a:ext cx="205029" cy="173485"/>
-          </a:xfrm>
-          <a:prstGeom prst="rect">
-            <a:avLst/>
-          </a:prstGeom>
-        </p:spPr>
-      </p:pic>
+      <p:sp>
+        <p:nvSpPr>
+          <p:cNvPr id="7" name="CuadroTexto 6">
+            <a:extLst>
+              <a:ext uri="{FF2B5EF4-FFF2-40B4-BE49-F238E27FC236}">
+                <a16:creationId xmlns:a16="http://schemas.microsoft.com/office/drawing/2014/main" id="{7D6E718B-C469-4618-9216-070A97242E43}"/>
+              </a:ext>
+            </a:extLst>
+          </p:cNvPr>
+          <p:cNvSpPr txBox="1"/>
+          <p:nvPr/>
+        </p:nvSpPr>
+        <p:spPr>
+          <a:xfrm>
+            <a:off x="4299458" y="464322"/>
+            <a:ext cx="337309" cy="369332"/>
+          </a:xfrm>
+          <a:prstGeom prst="rect">
+            <a:avLst/>
+          </a:prstGeom>
+          <a:noFill/>
+        </p:spPr>
+        <p:txBody>
+          <a:bodyPr wrap="square">
+            <a:spAutoFit/>
+          </a:bodyPr>
+          <a:lstStyle/>
+          <a:p>
+            <a:r>
+              <a:rPr lang="es-CO" dirty="0"/>
+              <a:t>🚩</a:t>
+            </a:r>
+          </a:p>
+        </p:txBody>
+      </p:sp>
+      <p:sp>
+        <p:nvSpPr>
+          <p:cNvPr id="8" name="CuadroTexto 7">
+            <a:extLst>
+              <a:ext uri="{FF2B5EF4-FFF2-40B4-BE49-F238E27FC236}">
+                <a16:creationId xmlns:a16="http://schemas.microsoft.com/office/drawing/2014/main" id="{A10C06B7-C5A5-4A5F-8872-F35553318260}"/>
+              </a:ext>
+            </a:extLst>
+          </p:cNvPr>
+          <p:cNvSpPr txBox="1"/>
+          <p:nvPr/>
+        </p:nvSpPr>
+        <p:spPr>
+          <a:xfrm>
+            <a:off x="4299458" y="834516"/>
+            <a:ext cx="5002586" cy="769441"/>
+          </a:xfrm>
+          <a:prstGeom prst="rect">
+            <a:avLst/>
+          </a:prstGeom>
+          <a:noFill/>
+        </p:spPr>
+        <p:txBody>
+          <a:bodyPr wrap="square" rtlCol="0">
+            <a:spAutoFit/>
+          </a:bodyPr>
+          <a:lstStyle/>
+          <a:p>
+            <a:r>
+              <a:rPr lang="es-CO" sz="2200" dirty="0">
+                <a:solidFill>
+                  <a:schemeClr val="accent1"/>
+                </a:solidFill>
+                <a:latin typeface="Arial" panose="020B0604020202020204" pitchFamily="34" charset="0"/>
+                <a:cs typeface="Arial" panose="020B0604020202020204" pitchFamily="34" charset="0"/>
+              </a:rPr>
+              <a:t>Fundamentos de programación</a:t>
+            </a:r>
+          </a:p>
+          <a:p>
+            <a:r>
+              <a:rPr lang="es-CO" sz="2200" dirty="0">
+                <a:solidFill>
+                  <a:schemeClr val="accent1"/>
+                </a:solidFill>
+                <a:latin typeface="Arial" panose="020B0604020202020204" pitchFamily="34" charset="0"/>
+                <a:cs typeface="Arial" panose="020B0604020202020204" pitchFamily="34" charset="0"/>
+              </a:rPr>
+              <a:t>Programación orientada a objetos</a:t>
+            </a:r>
+          </a:p>
+        </p:txBody>
+      </p:sp>
+      <p:sp>
+        <p:nvSpPr>
+          <p:cNvPr id="11" name="CuadroTexto 10">
+            <a:extLst>
+              <a:ext uri="{FF2B5EF4-FFF2-40B4-BE49-F238E27FC236}">
+                <a16:creationId xmlns:a16="http://schemas.microsoft.com/office/drawing/2014/main" id="{E4B51999-E21A-4A10-AFE9-DDAA58D50735}"/>
+              </a:ext>
+            </a:extLst>
+          </p:cNvPr>
+          <p:cNvSpPr txBox="1"/>
+          <p:nvPr/>
+        </p:nvSpPr>
+        <p:spPr>
+          <a:xfrm>
+            <a:off x="3938214" y="833654"/>
+            <a:ext cx="361244" cy="369332"/>
+          </a:xfrm>
+          <a:prstGeom prst="rect">
+            <a:avLst/>
+          </a:prstGeom>
+          <a:noFill/>
+        </p:spPr>
+        <p:txBody>
+          <a:bodyPr wrap="square">
+            <a:spAutoFit/>
+          </a:bodyPr>
+          <a:lstStyle/>
+          <a:p>
+            <a:r>
+              <a:rPr lang="es-CO" dirty="0"/>
+              <a:t>✔️</a:t>
+            </a:r>
+          </a:p>
+        </p:txBody>
+      </p:sp>
+      <p:sp>
+        <p:nvSpPr>
+          <p:cNvPr id="13" name="CuadroTexto 12">
+            <a:extLst>
+              <a:ext uri="{FF2B5EF4-FFF2-40B4-BE49-F238E27FC236}">
+                <a16:creationId xmlns:a16="http://schemas.microsoft.com/office/drawing/2014/main" id="{75D94532-661D-4537-A00C-E9D0E6569183}"/>
+              </a:ext>
+            </a:extLst>
+          </p:cNvPr>
+          <p:cNvSpPr txBox="1"/>
+          <p:nvPr/>
+        </p:nvSpPr>
+        <p:spPr>
+          <a:xfrm>
+            <a:off x="3938214" y="1190979"/>
+            <a:ext cx="372533" cy="369332"/>
+          </a:xfrm>
+          <a:prstGeom prst="rect">
+            <a:avLst/>
+          </a:prstGeom>
+          <a:noFill/>
+        </p:spPr>
+        <p:txBody>
+          <a:bodyPr wrap="square">
+            <a:spAutoFit/>
+          </a:bodyPr>
+          <a:lstStyle/>
+          <a:p>
+            <a:r>
+              <a:rPr lang="es-CO" dirty="0"/>
+              <a:t>⏳</a:t>
+            </a:r>
+          </a:p>
+        </p:txBody>
+      </p:sp>
     </p:spTree>
     <p:extLst>
       <p:ext uri="{BB962C8B-B14F-4D97-AF65-F5344CB8AC3E}">
-        <p14:creationId xmlns:p14="http://schemas.microsoft.com/office/powerpoint/2010/main" val="265926940"/>
+        <p14:creationId xmlns:p14="http://schemas.microsoft.com/office/powerpoint/2010/main" val="4212332541"/>
       </p:ext>
     </p:extLst>
   </p:cSld>
@@ -1853,10 +2123,322 @@
           <a:chExt cx="0" cy="0"/>
         </a:xfrm>
       </p:grpSpPr>
+      <p:sp>
+        <p:nvSpPr>
+          <p:cNvPr id="9" name="Rectángulo 8">
+            <a:extLst>
+              <a:ext uri="{FF2B5EF4-FFF2-40B4-BE49-F238E27FC236}">
+                <a16:creationId xmlns:a16="http://schemas.microsoft.com/office/drawing/2014/main" id="{CE841960-6C6E-4681-AD6C-F96CEDC3EC5E}"/>
+              </a:ext>
+            </a:extLst>
+          </p:cNvPr>
+          <p:cNvSpPr/>
+          <p:nvPr/>
+        </p:nvSpPr>
+        <p:spPr>
+          <a:xfrm>
+            <a:off x="9008535" y="3563223"/>
+            <a:ext cx="767643" cy="282222"/>
+          </a:xfrm>
+          <a:prstGeom prst="rect">
+            <a:avLst/>
+          </a:prstGeom>
+          <a:solidFill>
+            <a:schemeClr val="bg1">
+              <a:lumMod val="85000"/>
+            </a:schemeClr>
+          </a:solidFill>
+          <a:ln>
+            <a:noFill/>
+          </a:ln>
+        </p:spPr>
+        <p:style>
+          <a:lnRef idx="2">
+            <a:schemeClr val="accent1">
+              <a:shade val="50000"/>
+            </a:schemeClr>
+          </a:lnRef>
+          <a:fillRef idx="1">
+            <a:schemeClr val="accent1"/>
+          </a:fillRef>
+          <a:effectRef idx="0">
+            <a:schemeClr val="accent1"/>
+          </a:effectRef>
+          <a:fontRef idx="minor">
+            <a:schemeClr val="lt1"/>
+          </a:fontRef>
+        </p:style>
+        <p:txBody>
+          <a:bodyPr rtlCol="0" anchor="ctr"/>
+          <a:lstStyle/>
+          <a:p>
+            <a:pPr algn="ctr"/>
+            <a:endParaRPr lang="es-CO"/>
+          </a:p>
+        </p:txBody>
+      </p:sp>
+      <p:sp>
+        <p:nvSpPr>
+          <p:cNvPr id="5" name="Rectángulo: esquina doblada 4">
+            <a:extLst>
+              <a:ext uri="{FF2B5EF4-FFF2-40B4-BE49-F238E27FC236}">
+                <a16:creationId xmlns:a16="http://schemas.microsoft.com/office/drawing/2014/main" id="{C54275EE-AECB-499F-95FC-F6B146A257D2}"/>
+              </a:ext>
+            </a:extLst>
+          </p:cNvPr>
+          <p:cNvSpPr/>
+          <p:nvPr/>
+        </p:nvSpPr>
+        <p:spPr>
+          <a:xfrm>
+            <a:off x="9832622" y="4167664"/>
+            <a:ext cx="1331846" cy="607536"/>
+          </a:xfrm>
+          <a:prstGeom prst="foldedCorner">
+            <a:avLst/>
+          </a:prstGeom>
+          <a:ln>
+            <a:solidFill>
+              <a:schemeClr val="bg2">
+                <a:lumMod val="75000"/>
+              </a:schemeClr>
+            </a:solidFill>
+          </a:ln>
+        </p:spPr>
+        <p:style>
+          <a:lnRef idx="2">
+            <a:schemeClr val="dk1"/>
+          </a:lnRef>
+          <a:fillRef idx="1">
+            <a:schemeClr val="lt1"/>
+          </a:fillRef>
+          <a:effectRef idx="0">
+            <a:schemeClr val="dk1"/>
+          </a:effectRef>
+          <a:fontRef idx="minor">
+            <a:schemeClr val="dk1"/>
+          </a:fontRef>
+        </p:style>
+        <p:txBody>
+          <a:bodyPr rtlCol="0" anchor="ctr"/>
+          <a:lstStyle/>
+          <a:p>
+            <a:pPr algn="ctr"/>
+            <a:endParaRPr lang="es-CO"/>
+          </a:p>
+        </p:txBody>
+      </p:sp>
+      <p:pic>
+        <p:nvPicPr>
+          <p:cNvPr id="3" name="Imagen 2" descr="Diagrama&#10;&#10;Descripción generada automáticamente">
+            <a:extLst>
+              <a:ext uri="{FF2B5EF4-FFF2-40B4-BE49-F238E27FC236}">
+                <a16:creationId xmlns:a16="http://schemas.microsoft.com/office/drawing/2014/main" id="{CEEAA555-C3D8-4EDF-8D75-9500275732B2}"/>
+              </a:ext>
+            </a:extLst>
+          </p:cNvPr>
+          <p:cNvPicPr>
+            <a:picLocks noChangeAspect="1"/>
+          </p:cNvPicPr>
+          <p:nvPr/>
+        </p:nvPicPr>
+        <p:blipFill>
+          <a:blip r:embed="rId2">
+            <a:duotone>
+              <a:schemeClr val="bg2">
+                <a:shade val="45000"/>
+                <a:satMod val="135000"/>
+              </a:schemeClr>
+              <a:prstClr val="white"/>
+            </a:duotone>
+            <a:extLst>
+              <a:ext uri="{BEBA8EAE-BF5A-486C-A8C5-ECC9F3942E4B}">
+                <a14:imgProps xmlns:a14="http://schemas.microsoft.com/office/drawing/2010/main">
+                  <a14:imgLayer r:embed="rId3">
+                    <a14:imgEffect>
+                      <a14:brightnessContrast bright="20000" contrast="-20000"/>
+                    </a14:imgEffect>
+                  </a14:imgLayer>
+                </a14:imgProps>
+              </a:ext>
+            </a:extLst>
+          </a:blip>
+          <a:stretch>
+            <a:fillRect/>
+          </a:stretch>
+        </p:blipFill>
+        <p:spPr>
+          <a:xfrm>
+            <a:off x="0" y="0"/>
+            <a:ext cx="5778377" cy="6837486"/>
+          </a:xfrm>
+          <a:prstGeom prst="rect">
+            <a:avLst/>
+          </a:prstGeom>
+        </p:spPr>
+      </p:pic>
+      <p:sp>
+        <p:nvSpPr>
+          <p:cNvPr id="7" name="CuadroTexto 6">
+            <a:extLst>
+              <a:ext uri="{FF2B5EF4-FFF2-40B4-BE49-F238E27FC236}">
+                <a16:creationId xmlns:a16="http://schemas.microsoft.com/office/drawing/2014/main" id="{B6981300-C0B7-4753-9BC8-E1EC804F0549}"/>
+              </a:ext>
+            </a:extLst>
+          </p:cNvPr>
+          <p:cNvSpPr txBox="1"/>
+          <p:nvPr/>
+        </p:nvSpPr>
+        <p:spPr>
+          <a:xfrm>
+            <a:off x="9957044" y="4272297"/>
+            <a:ext cx="1331846" cy="369332"/>
+          </a:xfrm>
+          <a:prstGeom prst="rect">
+            <a:avLst/>
+          </a:prstGeom>
+          <a:noFill/>
+        </p:spPr>
+        <p:txBody>
+          <a:bodyPr wrap="square">
+            <a:spAutoFit/>
+          </a:bodyPr>
+          <a:lstStyle/>
+          <a:p>
+            <a:r>
+              <a:rPr lang="es-ES" dirty="0" err="1">
+                <a:solidFill>
+                  <a:schemeClr val="bg2">
+                    <a:lumMod val="50000"/>
+                  </a:schemeClr>
+                </a:solidFill>
+                <a:latin typeface="Arial" panose="020B0604020202020204" pitchFamily="34" charset="0"/>
+                <a:cs typeface="Arial" panose="020B0604020202020204" pitchFamily="34" charset="0"/>
+              </a:rPr>
+              <a:t>roadmap</a:t>
+            </a:r>
+            <a:endParaRPr lang="es-CO" dirty="0">
+              <a:solidFill>
+                <a:schemeClr val="bg2">
+                  <a:lumMod val="50000"/>
+                </a:schemeClr>
+              </a:solidFill>
+              <a:latin typeface="Arial" panose="020B0604020202020204" pitchFamily="34" charset="0"/>
+              <a:cs typeface="Arial" panose="020B0604020202020204" pitchFamily="34" charset="0"/>
+            </a:endParaRPr>
+          </a:p>
+        </p:txBody>
+      </p:sp>
+      <p:cxnSp>
+        <p:nvCxnSpPr>
+          <p:cNvPr id="8" name="Conector: curvado 7">
+            <a:extLst>
+              <a:ext uri="{FF2B5EF4-FFF2-40B4-BE49-F238E27FC236}">
+                <a16:creationId xmlns:a16="http://schemas.microsoft.com/office/drawing/2014/main" id="{2D6A64AF-2530-468C-8DA9-F86855B14465}"/>
+              </a:ext>
+            </a:extLst>
+          </p:cNvPr>
+          <p:cNvCxnSpPr>
+            <a:cxnSpLocks/>
+          </p:cNvCxnSpPr>
+          <p:nvPr/>
+        </p:nvCxnSpPr>
+        <p:spPr>
+          <a:xfrm rot="16200000" flipH="1">
+            <a:off x="9177351" y="3929050"/>
+            <a:ext cx="700943" cy="609600"/>
+          </a:xfrm>
+          <a:prstGeom prst="curvedConnector2">
+            <a:avLst/>
+          </a:prstGeom>
+          <a:ln>
+            <a:solidFill>
+              <a:schemeClr val="bg2">
+                <a:lumMod val="75000"/>
+              </a:schemeClr>
+            </a:solidFill>
+            <a:tailEnd type="triangle"/>
+          </a:ln>
+        </p:spPr>
+        <p:style>
+          <a:lnRef idx="1">
+            <a:schemeClr val="dk1"/>
+          </a:lnRef>
+          <a:fillRef idx="0">
+            <a:schemeClr val="dk1"/>
+          </a:fillRef>
+          <a:effectRef idx="0">
+            <a:schemeClr val="dk1"/>
+          </a:effectRef>
+          <a:fontRef idx="minor">
+            <a:schemeClr val="tx1"/>
+          </a:fontRef>
+        </p:style>
+      </p:cxnSp>
+      <p:sp>
+        <p:nvSpPr>
+          <p:cNvPr id="4" name="CuadroTexto 3">
+            <a:extLst>
+              <a:ext uri="{FF2B5EF4-FFF2-40B4-BE49-F238E27FC236}">
+                <a16:creationId xmlns:a16="http://schemas.microsoft.com/office/drawing/2014/main" id="{EA629B40-9106-4E7F-B7B7-605ADFF26A28}"/>
+              </a:ext>
+            </a:extLst>
+          </p:cNvPr>
+          <p:cNvSpPr txBox="1"/>
+          <p:nvPr/>
+        </p:nvSpPr>
+        <p:spPr>
+          <a:xfrm>
+            <a:off x="6090599" y="2690336"/>
+            <a:ext cx="4267200" cy="1477328"/>
+          </a:xfrm>
+          <a:prstGeom prst="rect">
+            <a:avLst/>
+          </a:prstGeom>
+          <a:noFill/>
+        </p:spPr>
+        <p:txBody>
+          <a:bodyPr wrap="square">
+            <a:spAutoFit/>
+          </a:bodyPr>
+          <a:lstStyle/>
+          <a:p>
+            <a:r>
+              <a:rPr lang="es-ES" dirty="0">
+                <a:solidFill>
+                  <a:schemeClr val="bg2">
+                    <a:lumMod val="25000"/>
+                  </a:schemeClr>
+                </a:solidFill>
+                <a:latin typeface="Arial" panose="020B0604020202020204" pitchFamily="34" charset="0"/>
+                <a:cs typeface="Arial" panose="020B0604020202020204" pitchFamily="34" charset="0"/>
+              </a:rPr>
+              <a:t>Siempre hay algo nuevo por aprender, existe una deuda técnica en cada profesional asociada a su perfil, por tanto </a:t>
+            </a:r>
+            <a:r>
+              <a:rPr lang="es-ES" dirty="0">
+                <a:solidFill>
+                  <a:srgbClr val="E83566"/>
+                </a:solidFill>
+                <a:latin typeface="Arial" panose="020B0604020202020204" pitchFamily="34" charset="0"/>
+                <a:cs typeface="Arial" panose="020B0604020202020204" pitchFamily="34" charset="0"/>
+              </a:rPr>
+              <a:t>se tratará siempre del camino y no de un punto al cual llegar</a:t>
+            </a:r>
+            <a:endParaRPr lang="es-CO" dirty="0">
+              <a:solidFill>
+                <a:srgbClr val="E83566"/>
+              </a:solidFill>
+              <a:latin typeface="Arial" panose="020B0604020202020204" pitchFamily="34" charset="0"/>
+              <a:cs typeface="Arial" panose="020B0604020202020204" pitchFamily="34" charset="0"/>
+            </a:endParaRPr>
+          </a:p>
+        </p:txBody>
+      </p:sp>
     </p:spTree>
     <p:extLst>
       <p:ext uri="{BB962C8B-B14F-4D97-AF65-F5344CB8AC3E}">
-        <p14:creationId xmlns:p14="http://schemas.microsoft.com/office/powerpoint/2010/main" val="1625820414"/>
+        <p14:creationId xmlns:p14="http://schemas.microsoft.com/office/powerpoint/2010/main" val="2306563150"/>
       </p:ext>
     </p:extLst>
   </p:cSld>
@@ -1905,7 +2487,7 @@
         </p:blipFill>
         <p:spPr>
           <a:xfrm>
-            <a:off x="3216862" y="3150168"/>
+            <a:off x="1354196" y="1674892"/>
             <a:ext cx="205029" cy="173485"/>
           </a:xfrm>
           <a:prstGeom prst="rect">
@@ -1915,10 +2497,10 @@
       </p:pic>
       <p:sp>
         <p:nvSpPr>
-          <p:cNvPr id="14" name="CuadroTexto 13">
-            <a:extLst>
-              <a:ext uri="{FF2B5EF4-FFF2-40B4-BE49-F238E27FC236}">
-                <a16:creationId xmlns:a16="http://schemas.microsoft.com/office/drawing/2014/main" id="{3E764585-5CEC-4D97-93DF-03FFBF2E05B4}"/>
+          <p:cNvPr id="4" name="CuadroTexto 3">
+            <a:extLst>
+              <a:ext uri="{FF2B5EF4-FFF2-40B4-BE49-F238E27FC236}">
+                <a16:creationId xmlns:a16="http://schemas.microsoft.com/office/drawing/2014/main" id="{F06CDA0E-7A2F-4EBE-ABD3-0CE610FBF91D}"/>
               </a:ext>
             </a:extLst>
           </p:cNvPr>
@@ -1927,8 +2509,8 @@
         </p:nvSpPr>
         <p:spPr>
           <a:xfrm>
-            <a:off x="5283267" y="6127076"/>
-            <a:ext cx="4001668" cy="338554"/>
+            <a:off x="1559225" y="1542218"/>
+            <a:ext cx="4267200" cy="1477328"/>
           </a:xfrm>
           <a:prstGeom prst="rect">
             <a:avLst/>
@@ -1942,27 +2524,262 @@
           <a:lstStyle/>
           <a:p>
             <a:r>
-              <a:rPr lang="es-ES" sz="1600" dirty="0">
-                <a:solidFill>
-                  <a:schemeClr val="tx1">
-                    <a:lumMod val="85000"/>
-                    <a:lumOff val="15000"/>
+              <a:rPr lang="es-ES" dirty="0">
+                <a:solidFill>
+                  <a:schemeClr val="bg2">
+                    <a:lumMod val="25000"/>
                   </a:schemeClr>
                 </a:solidFill>
-                <a:latin typeface="Cambria Math" panose="02040503050406030204" pitchFamily="18" charset="0"/>
-                <a:ea typeface="Cambria Math" panose="02040503050406030204" pitchFamily="18" charset="0"/>
-              </a:rPr>
-              <a:t>Créditos: Los innovadores – Walter Isaacson</a:t>
-            </a:r>
-            <a:endParaRPr lang="es-ES" sz="1600" b="1" dirty="0">
+                <a:latin typeface="Arial" panose="020B0604020202020204" pitchFamily="34" charset="0"/>
+                <a:cs typeface="Arial" panose="020B0604020202020204" pitchFamily="34" charset="0"/>
+              </a:rPr>
+              <a:t>Veamos un ejemplo de un conocido, lenguaje: el español. </a:t>
+            </a:r>
+          </a:p>
+          <a:p>
+            <a:endParaRPr lang="es-ES" dirty="0">
               <a:solidFill>
-                <a:schemeClr val="tx1">
-                  <a:lumMod val="85000"/>
-                  <a:lumOff val="15000"/>
+                <a:schemeClr val="bg2">
+                  <a:lumMod val="25000"/>
                 </a:schemeClr>
               </a:solidFill>
-              <a:latin typeface="Cambria Math" panose="02040503050406030204" pitchFamily="18" charset="0"/>
-              <a:ea typeface="Cambria Math" panose="02040503050406030204" pitchFamily="18" charset="0"/>
+              <a:latin typeface="Arial" panose="020B0604020202020204" pitchFamily="34" charset="0"/>
+              <a:cs typeface="Arial" panose="020B0604020202020204" pitchFamily="34" charset="0"/>
+            </a:endParaRPr>
+          </a:p>
+          <a:p>
+            <a:r>
+              <a:rPr lang="es-ES" dirty="0">
+                <a:solidFill>
+                  <a:schemeClr val="bg2">
+                    <a:lumMod val="25000"/>
+                  </a:schemeClr>
+                </a:solidFill>
+                <a:latin typeface="Arial" panose="020B0604020202020204" pitchFamily="34" charset="0"/>
+                <a:cs typeface="Arial" panose="020B0604020202020204" pitchFamily="34" charset="0"/>
+              </a:rPr>
+              <a:t>¿Cuál es su porcentaje de comprensión de los siguiente párrafos?</a:t>
+            </a:r>
+            <a:endParaRPr lang="es-CO" dirty="0">
+              <a:solidFill>
+                <a:srgbClr val="E83566"/>
+              </a:solidFill>
+              <a:latin typeface="Arial" panose="020B0604020202020204" pitchFamily="34" charset="0"/>
+              <a:cs typeface="Arial" panose="020B0604020202020204" pitchFamily="34" charset="0"/>
+            </a:endParaRPr>
+          </a:p>
+        </p:txBody>
+      </p:sp>
+      <p:sp>
+        <p:nvSpPr>
+          <p:cNvPr id="5" name="CuadroTexto 4">
+            <a:extLst>
+              <a:ext uri="{FF2B5EF4-FFF2-40B4-BE49-F238E27FC236}">
+                <a16:creationId xmlns:a16="http://schemas.microsoft.com/office/drawing/2014/main" id="{0DB711B4-3E83-49EC-ABEB-0F373C6D278A}"/>
+              </a:ext>
+            </a:extLst>
+          </p:cNvPr>
+          <p:cNvSpPr txBox="1"/>
+          <p:nvPr/>
+        </p:nvSpPr>
+        <p:spPr>
+          <a:xfrm>
+            <a:off x="6031454" y="3015966"/>
+            <a:ext cx="5426768" cy="2031325"/>
+          </a:xfrm>
+          <a:prstGeom prst="rect">
+            <a:avLst/>
+          </a:prstGeom>
+          <a:noFill/>
+        </p:spPr>
+        <p:txBody>
+          <a:bodyPr wrap="square">
+            <a:spAutoFit/>
+          </a:bodyPr>
+          <a:lstStyle/>
+          <a:p>
+            <a:r>
+              <a:rPr lang="es-ES" dirty="0">
+                <a:solidFill>
+                  <a:schemeClr val="bg2">
+                    <a:lumMod val="50000"/>
+                  </a:schemeClr>
+                </a:solidFill>
+                <a:latin typeface="Arial" panose="020B0604020202020204" pitchFamily="34" charset="0"/>
+                <a:cs typeface="Arial" panose="020B0604020202020204" pitchFamily="34" charset="0"/>
+              </a:rPr>
+              <a:t>Salomón Toledano se </a:t>
+            </a:r>
+            <a:r>
+              <a:rPr lang="es-ES" b="1" dirty="0">
+                <a:solidFill>
+                  <a:srgbClr val="E83566"/>
+                </a:solidFill>
+                <a:latin typeface="Arial" panose="020B0604020202020204" pitchFamily="34" charset="0"/>
+                <a:cs typeface="Arial" panose="020B0604020202020204" pitchFamily="34" charset="0"/>
+              </a:rPr>
+              <a:t>jactaba</a:t>
+            </a:r>
+            <a:r>
+              <a:rPr lang="es-ES" dirty="0">
+                <a:solidFill>
+                  <a:schemeClr val="bg2">
+                    <a:lumMod val="50000"/>
+                  </a:schemeClr>
+                </a:solidFill>
+                <a:latin typeface="Arial" panose="020B0604020202020204" pitchFamily="34" charset="0"/>
+                <a:cs typeface="Arial" panose="020B0604020202020204" pitchFamily="34" charset="0"/>
+              </a:rPr>
+              <a:t> de hablar doce lenguas y poder interpretarlas todas en las dos direcciones. Era un hombre bajito y </a:t>
+            </a:r>
+            <a:r>
+              <a:rPr lang="es-ES" b="1" dirty="0">
+                <a:solidFill>
+                  <a:srgbClr val="E83566"/>
+                </a:solidFill>
+                <a:latin typeface="Arial" panose="020B0604020202020204" pitchFamily="34" charset="0"/>
+                <a:cs typeface="Arial" panose="020B0604020202020204" pitchFamily="34" charset="0"/>
+              </a:rPr>
+              <a:t>esmirriado</a:t>
+            </a:r>
+            <a:r>
+              <a:rPr lang="es-ES" dirty="0">
+                <a:solidFill>
+                  <a:schemeClr val="bg2">
+                    <a:lumMod val="50000"/>
+                  </a:schemeClr>
+                </a:solidFill>
+                <a:latin typeface="Arial" panose="020B0604020202020204" pitchFamily="34" charset="0"/>
+                <a:cs typeface="Arial" panose="020B0604020202020204" pitchFamily="34" charset="0"/>
+              </a:rPr>
+              <a:t>, medio perdido en unos trajes </a:t>
+            </a:r>
+            <a:r>
+              <a:rPr lang="es-ES" b="1" dirty="0" err="1">
+                <a:solidFill>
+                  <a:srgbClr val="E83566"/>
+                </a:solidFill>
+                <a:latin typeface="Arial" panose="020B0604020202020204" pitchFamily="34" charset="0"/>
+                <a:cs typeface="Arial" panose="020B0604020202020204" pitchFamily="34" charset="0"/>
+              </a:rPr>
+              <a:t>bolsudos</a:t>
+            </a:r>
+            <a:r>
+              <a:rPr lang="es-ES" dirty="0">
+                <a:solidFill>
+                  <a:schemeClr val="bg2">
+                    <a:lumMod val="50000"/>
+                  </a:schemeClr>
+                </a:solidFill>
+                <a:latin typeface="Arial" panose="020B0604020202020204" pitchFamily="34" charset="0"/>
+                <a:cs typeface="Arial" panose="020B0604020202020204" pitchFamily="34" charset="0"/>
+              </a:rPr>
+              <a:t> que, se diría, se compraba a propósito para que le quedaran grandes, y unos ojos de tortuga indecisos entre la </a:t>
+            </a:r>
+            <a:r>
+              <a:rPr lang="es-ES" b="1" dirty="0">
+                <a:solidFill>
+                  <a:srgbClr val="E83566"/>
+                </a:solidFill>
+                <a:latin typeface="Arial" panose="020B0604020202020204" pitchFamily="34" charset="0"/>
+                <a:cs typeface="Arial" panose="020B0604020202020204" pitchFamily="34" charset="0"/>
+              </a:rPr>
+              <a:t>vigilia</a:t>
+            </a:r>
+            <a:r>
+              <a:rPr lang="es-ES" dirty="0">
+                <a:solidFill>
+                  <a:schemeClr val="bg2">
+                    <a:lumMod val="50000"/>
+                  </a:schemeClr>
+                </a:solidFill>
+                <a:latin typeface="Arial" panose="020B0604020202020204" pitchFamily="34" charset="0"/>
+                <a:cs typeface="Arial" panose="020B0604020202020204" pitchFamily="34" charset="0"/>
+              </a:rPr>
+              <a:t> y el sueño.</a:t>
+            </a:r>
+            <a:endParaRPr lang="es-CO" dirty="0">
+              <a:solidFill>
+                <a:schemeClr val="bg2">
+                  <a:lumMod val="50000"/>
+                </a:schemeClr>
+              </a:solidFill>
+              <a:latin typeface="Arial" panose="020B0604020202020204" pitchFamily="34" charset="0"/>
+              <a:cs typeface="Arial" panose="020B0604020202020204" pitchFamily="34" charset="0"/>
+            </a:endParaRPr>
+          </a:p>
+        </p:txBody>
+      </p:sp>
+      <p:sp>
+        <p:nvSpPr>
+          <p:cNvPr id="6" name="CuadroTexto 5">
+            <a:extLst>
+              <a:ext uri="{FF2B5EF4-FFF2-40B4-BE49-F238E27FC236}">
+                <a16:creationId xmlns:a16="http://schemas.microsoft.com/office/drawing/2014/main" id="{EEBFA667-D6BB-46D8-B0EF-9502A880185B}"/>
+              </a:ext>
+            </a:extLst>
+          </p:cNvPr>
+          <p:cNvSpPr txBox="1"/>
+          <p:nvPr/>
+        </p:nvSpPr>
+        <p:spPr>
+          <a:xfrm>
+            <a:off x="1354196" y="4922881"/>
+            <a:ext cx="4741804" cy="1200329"/>
+          </a:xfrm>
+          <a:prstGeom prst="rect">
+            <a:avLst/>
+          </a:prstGeom>
+          <a:noFill/>
+        </p:spPr>
+        <p:txBody>
+          <a:bodyPr wrap="square">
+            <a:spAutoFit/>
+          </a:bodyPr>
+          <a:lstStyle/>
+          <a:p>
+            <a:r>
+              <a:rPr lang="es-ES" dirty="0">
+                <a:solidFill>
+                  <a:schemeClr val="bg2">
+                    <a:lumMod val="50000"/>
+                  </a:schemeClr>
+                </a:solidFill>
+                <a:latin typeface="Arial" panose="020B0604020202020204" pitchFamily="34" charset="0"/>
+                <a:cs typeface="Arial" panose="020B0604020202020204" pitchFamily="34" charset="0"/>
+              </a:rPr>
+              <a:t>Le </a:t>
+            </a:r>
+            <a:r>
+              <a:rPr lang="es-ES" b="1" dirty="0">
+                <a:solidFill>
+                  <a:srgbClr val="5C739C"/>
+                </a:solidFill>
+                <a:latin typeface="Arial" panose="020B0604020202020204" pitchFamily="34" charset="0"/>
+                <a:cs typeface="Arial" panose="020B0604020202020204" pitchFamily="34" charset="0"/>
+              </a:rPr>
+              <a:t>raleaban</a:t>
+            </a:r>
+            <a:r>
+              <a:rPr lang="es-ES" dirty="0">
+                <a:solidFill>
+                  <a:schemeClr val="bg2">
+                    <a:lumMod val="50000"/>
+                  </a:schemeClr>
+                </a:solidFill>
+                <a:latin typeface="Arial" panose="020B0604020202020204" pitchFamily="34" charset="0"/>
+                <a:cs typeface="Arial" panose="020B0604020202020204" pitchFamily="34" charset="0"/>
+              </a:rPr>
+              <a:t> los cabellos y se afeitaba sólo cada dos o tres días, de modo que siempre andaba con una sombra grisácea ensuciándole la cara. </a:t>
+            </a:r>
+            <a:endParaRPr lang="es-CO" dirty="0">
+              <a:solidFill>
+                <a:schemeClr val="bg2">
+                  <a:lumMod val="50000"/>
+                </a:schemeClr>
+              </a:solidFill>
+              <a:latin typeface="Arial" panose="020B0604020202020204" pitchFamily="34" charset="0"/>
+              <a:cs typeface="Arial" panose="020B0604020202020204" pitchFamily="34" charset="0"/>
             </a:endParaRPr>
           </a:p>
         </p:txBody>
@@ -1970,7 +2787,7 @@
     </p:spTree>
     <p:extLst>
       <p:ext uri="{BB962C8B-B14F-4D97-AF65-F5344CB8AC3E}">
-        <p14:creationId xmlns:p14="http://schemas.microsoft.com/office/powerpoint/2010/main" val="3588353348"/>
+        <p14:creationId xmlns:p14="http://schemas.microsoft.com/office/powerpoint/2010/main" val="1871931096"/>
       </p:ext>
     </p:extLst>
   </p:cSld>
@@ -1997,12 +2814,624 @@
           <a:chExt cx="0" cy="0"/>
         </a:xfrm>
       </p:grpSpPr>
+      <p:sp>
+        <p:nvSpPr>
+          <p:cNvPr id="5" name="CuadroTexto 4">
+            <a:extLst>
+              <a:ext uri="{FF2B5EF4-FFF2-40B4-BE49-F238E27FC236}">
+                <a16:creationId xmlns:a16="http://schemas.microsoft.com/office/drawing/2014/main" id="{0DB711B4-3E83-49EC-ABEB-0F373C6D278A}"/>
+              </a:ext>
+            </a:extLst>
+          </p:cNvPr>
+          <p:cNvSpPr txBox="1"/>
+          <p:nvPr/>
+        </p:nvSpPr>
+        <p:spPr>
+          <a:xfrm>
+            <a:off x="1354196" y="1967087"/>
+            <a:ext cx="4877271" cy="1477328"/>
+          </a:xfrm>
+          <a:prstGeom prst="rect">
+            <a:avLst/>
+          </a:prstGeom>
+          <a:noFill/>
+        </p:spPr>
+        <p:txBody>
+          <a:bodyPr wrap="square">
+            <a:spAutoFit/>
+          </a:bodyPr>
+          <a:lstStyle/>
+          <a:p>
+            <a:r>
+              <a:rPr lang="es-ES" dirty="0">
+                <a:solidFill>
+                  <a:schemeClr val="bg2">
+                    <a:lumMod val="50000"/>
+                  </a:schemeClr>
+                </a:solidFill>
+                <a:latin typeface="Arial" panose="020B0604020202020204" pitchFamily="34" charset="0"/>
+                <a:cs typeface="Arial" panose="020B0604020202020204" pitchFamily="34" charset="0"/>
+              </a:rPr>
+              <a:t>Nadie que lo viera así, tan poca cosa, el perfecto </a:t>
+            </a:r>
+            <a:r>
+              <a:rPr lang="es-ES" b="1" dirty="0">
+                <a:solidFill>
+                  <a:srgbClr val="5C739C"/>
+                </a:solidFill>
+                <a:latin typeface="Arial" panose="020B0604020202020204" pitchFamily="34" charset="0"/>
+                <a:cs typeface="Arial" panose="020B0604020202020204" pitchFamily="34" charset="0"/>
+              </a:rPr>
+              <a:t>don nadie</a:t>
+            </a:r>
+            <a:r>
+              <a:rPr lang="es-ES" dirty="0">
+                <a:solidFill>
+                  <a:schemeClr val="bg2">
+                    <a:lumMod val="50000"/>
+                  </a:schemeClr>
+                </a:solidFill>
+                <a:latin typeface="Arial" panose="020B0604020202020204" pitchFamily="34" charset="0"/>
+                <a:cs typeface="Arial" panose="020B0604020202020204" pitchFamily="34" charset="0"/>
+              </a:rPr>
+              <a:t>, hubiera podido imaginarse la extraordinaria facilidad de que estaba dotado para los idiomas y su fabulosa </a:t>
+            </a:r>
+            <a:r>
+              <a:rPr lang="es-ES" b="1" dirty="0">
+                <a:solidFill>
+                  <a:srgbClr val="E83566"/>
+                </a:solidFill>
+                <a:latin typeface="Arial" panose="020B0604020202020204" pitchFamily="34" charset="0"/>
+                <a:cs typeface="Arial" panose="020B0604020202020204" pitchFamily="34" charset="0"/>
+              </a:rPr>
+              <a:t>aptitud</a:t>
+            </a:r>
+            <a:r>
+              <a:rPr lang="es-ES" dirty="0">
+                <a:solidFill>
+                  <a:schemeClr val="bg2">
+                    <a:lumMod val="50000"/>
+                  </a:schemeClr>
+                </a:solidFill>
+                <a:latin typeface="Arial" panose="020B0604020202020204" pitchFamily="34" charset="0"/>
+                <a:cs typeface="Arial" panose="020B0604020202020204" pitchFamily="34" charset="0"/>
+              </a:rPr>
+              <a:t> para interpretarlos.</a:t>
+            </a:r>
+            <a:endParaRPr lang="es-CO" dirty="0">
+              <a:solidFill>
+                <a:schemeClr val="bg2">
+                  <a:lumMod val="50000"/>
+                </a:schemeClr>
+              </a:solidFill>
+              <a:latin typeface="Arial" panose="020B0604020202020204" pitchFamily="34" charset="0"/>
+              <a:cs typeface="Arial" panose="020B0604020202020204" pitchFamily="34" charset="0"/>
+            </a:endParaRPr>
+          </a:p>
+        </p:txBody>
+      </p:sp>
+      <p:sp>
+        <p:nvSpPr>
+          <p:cNvPr id="6" name="CuadroTexto 5">
+            <a:extLst>
+              <a:ext uri="{FF2B5EF4-FFF2-40B4-BE49-F238E27FC236}">
+                <a16:creationId xmlns:a16="http://schemas.microsoft.com/office/drawing/2014/main" id="{EEBFA667-D6BB-46D8-B0EF-9502A880185B}"/>
+              </a:ext>
+            </a:extLst>
+          </p:cNvPr>
+          <p:cNvSpPr txBox="1"/>
+          <p:nvPr/>
+        </p:nvSpPr>
+        <p:spPr>
+          <a:xfrm>
+            <a:off x="1354196" y="3608362"/>
+            <a:ext cx="4741804" cy="1477328"/>
+          </a:xfrm>
+          <a:prstGeom prst="rect">
+            <a:avLst/>
+          </a:prstGeom>
+          <a:noFill/>
+        </p:spPr>
+        <p:txBody>
+          <a:bodyPr wrap="square">
+            <a:spAutoFit/>
+          </a:bodyPr>
+          <a:lstStyle/>
+          <a:p>
+            <a:r>
+              <a:rPr lang="es-ES" dirty="0">
+                <a:solidFill>
+                  <a:schemeClr val="bg2">
+                    <a:lumMod val="50000"/>
+                  </a:schemeClr>
+                </a:solidFill>
+                <a:latin typeface="Arial" panose="020B0604020202020204" pitchFamily="34" charset="0"/>
+                <a:cs typeface="Arial" panose="020B0604020202020204" pitchFamily="34" charset="0"/>
+              </a:rPr>
+              <a:t>... Todo el mundo lo admiraba y lo envidiaba, pero muy pocos de nuestros colegas lo querían. Los </a:t>
+            </a:r>
+            <a:r>
+              <a:rPr lang="es-ES" b="1" dirty="0">
+                <a:solidFill>
+                  <a:srgbClr val="5C739C"/>
+                </a:solidFill>
+                <a:latin typeface="Arial" panose="020B0604020202020204" pitchFamily="34" charset="0"/>
+                <a:cs typeface="Arial" panose="020B0604020202020204" pitchFamily="34" charset="0"/>
+              </a:rPr>
+              <a:t>abrumaban</a:t>
+            </a:r>
+            <a:r>
+              <a:rPr lang="es-ES" dirty="0">
+                <a:solidFill>
+                  <a:schemeClr val="bg2">
+                    <a:lumMod val="50000"/>
+                  </a:schemeClr>
+                </a:solidFill>
+                <a:latin typeface="Arial" panose="020B0604020202020204" pitchFamily="34" charset="0"/>
+                <a:cs typeface="Arial" panose="020B0604020202020204" pitchFamily="34" charset="0"/>
+              </a:rPr>
+              <a:t> su </a:t>
+            </a:r>
+            <a:r>
+              <a:rPr lang="es-ES" b="1" dirty="0">
+                <a:solidFill>
+                  <a:srgbClr val="5C739C"/>
+                </a:solidFill>
+                <a:latin typeface="Arial" panose="020B0604020202020204" pitchFamily="34" charset="0"/>
+                <a:cs typeface="Arial" panose="020B0604020202020204" pitchFamily="34" charset="0"/>
+              </a:rPr>
+              <a:t>locuacidad</a:t>
+            </a:r>
+            <a:r>
+              <a:rPr lang="es-ES" dirty="0">
+                <a:solidFill>
+                  <a:schemeClr val="bg2">
+                    <a:lumMod val="50000"/>
+                  </a:schemeClr>
+                </a:solidFill>
+                <a:latin typeface="Arial" panose="020B0604020202020204" pitchFamily="34" charset="0"/>
+                <a:cs typeface="Arial" panose="020B0604020202020204" pitchFamily="34" charset="0"/>
+              </a:rPr>
+              <a:t>, su falta de tacto, sus chiquillerías y la avidez con que acaparaba la conversación.</a:t>
+            </a:r>
+            <a:endParaRPr lang="es-CO" dirty="0">
+              <a:solidFill>
+                <a:schemeClr val="bg2">
+                  <a:lumMod val="50000"/>
+                </a:schemeClr>
+              </a:solidFill>
+              <a:latin typeface="Arial" panose="020B0604020202020204" pitchFamily="34" charset="0"/>
+              <a:cs typeface="Arial" panose="020B0604020202020204" pitchFamily="34" charset="0"/>
+            </a:endParaRPr>
+          </a:p>
+        </p:txBody>
+      </p:sp>
+      <p:sp>
+        <p:nvSpPr>
+          <p:cNvPr id="7" name="CuadroTexto 6">
+            <a:extLst>
+              <a:ext uri="{FF2B5EF4-FFF2-40B4-BE49-F238E27FC236}">
+                <a16:creationId xmlns:a16="http://schemas.microsoft.com/office/drawing/2014/main" id="{FA43AAA6-1575-49A5-BE35-33B635CCD8BE}"/>
+              </a:ext>
+            </a:extLst>
+          </p:cNvPr>
+          <p:cNvSpPr txBox="1"/>
+          <p:nvPr/>
+        </p:nvSpPr>
+        <p:spPr>
+          <a:xfrm>
+            <a:off x="4080934" y="6169116"/>
+            <a:ext cx="5198533" cy="338554"/>
+          </a:xfrm>
+          <a:prstGeom prst="rect">
+            <a:avLst/>
+          </a:prstGeom>
+          <a:noFill/>
+        </p:spPr>
+        <p:txBody>
+          <a:bodyPr wrap="square">
+            <a:spAutoFit/>
+          </a:bodyPr>
+          <a:lstStyle/>
+          <a:p>
+            <a:r>
+              <a:rPr lang="es-ES" sz="1600" dirty="0">
+                <a:solidFill>
+                  <a:schemeClr val="tx1">
+                    <a:lumMod val="85000"/>
+                    <a:lumOff val="15000"/>
+                  </a:schemeClr>
+                </a:solidFill>
+                <a:latin typeface="Cambria Math" panose="02040503050406030204" pitchFamily="18" charset="0"/>
+                <a:ea typeface="Cambria Math" panose="02040503050406030204" pitchFamily="18" charset="0"/>
+              </a:rPr>
+              <a:t>Créditos: Travesuras de la ni</a:t>
+            </a:r>
+            <a:r>
+              <a:rPr lang="es-CO" sz="1600" dirty="0">
+                <a:solidFill>
+                  <a:schemeClr val="tx1">
+                    <a:lumMod val="85000"/>
+                    <a:lumOff val="15000"/>
+                  </a:schemeClr>
+                </a:solidFill>
+                <a:latin typeface="Cambria Math" panose="02040503050406030204" pitchFamily="18" charset="0"/>
+                <a:ea typeface="Cambria Math" panose="02040503050406030204" pitchFamily="18" charset="0"/>
+              </a:rPr>
+              <a:t>ña mala – Mario Vargas Llosa</a:t>
+            </a:r>
+            <a:endParaRPr lang="es-ES" sz="1600" b="1" dirty="0">
+              <a:solidFill>
+                <a:schemeClr val="tx1">
+                  <a:lumMod val="85000"/>
+                  <a:lumOff val="15000"/>
+                </a:schemeClr>
+              </a:solidFill>
+              <a:latin typeface="Cambria Math" panose="02040503050406030204" pitchFamily="18" charset="0"/>
+              <a:ea typeface="Cambria Math" panose="02040503050406030204" pitchFamily="18" charset="0"/>
+            </a:endParaRPr>
+          </a:p>
+        </p:txBody>
+      </p:sp>
       <p:pic>
         <p:nvPicPr>
-          <p:cNvPr id="3" name="Imagen 2" descr="Interfaz de usuario gráfica, Texto, Aplicación&#10;&#10;Descripción generada automáticamente">
-            <a:extLst>
-              <a:ext uri="{FF2B5EF4-FFF2-40B4-BE49-F238E27FC236}">
-                <a16:creationId xmlns:a16="http://schemas.microsoft.com/office/drawing/2014/main" id="{C56FC406-BA5D-CB4E-8D1C-EEA4A245E74A}"/>
+          <p:cNvPr id="3" name="Imagen 2" descr="Imagen que contiene persona, interior, hombre, joven&#10;&#10;Descripción generada automáticamente">
+            <a:extLst>
+              <a:ext uri="{FF2B5EF4-FFF2-40B4-BE49-F238E27FC236}">
+                <a16:creationId xmlns:a16="http://schemas.microsoft.com/office/drawing/2014/main" id="{B08DBBD9-993A-4C26-8683-1759094A9FE6}"/>
+              </a:ext>
+            </a:extLst>
+          </p:cNvPr>
+          <p:cNvPicPr>
+            <a:picLocks noChangeAspect="1"/>
+          </p:cNvPicPr>
+          <p:nvPr/>
+        </p:nvPicPr>
+        <p:blipFill>
+          <a:blip r:embed="rId2">
+            <a:duotone>
+              <a:schemeClr val="bg2">
+                <a:shade val="45000"/>
+                <a:satMod val="135000"/>
+              </a:schemeClr>
+              <a:prstClr val="white"/>
+            </a:duotone>
+            <a:extLst>
+              <a:ext uri="{BEBA8EAE-BF5A-486C-A8C5-ECC9F3942E4B}">
+                <a14:imgProps xmlns:a14="http://schemas.microsoft.com/office/drawing/2010/main">
+                  <a14:imgLayer r:embed="rId3">
+                    <a14:imgEffect>
+                      <a14:brightnessContrast bright="40000" contrast="40000"/>
+                    </a14:imgEffect>
+                  </a14:imgLayer>
+                </a14:imgProps>
+              </a:ext>
+            </a:extLst>
+          </a:blip>
+          <a:stretch>
+            <a:fillRect/>
+          </a:stretch>
+        </p:blipFill>
+        <p:spPr>
+          <a:xfrm flipH="1" flipV="1">
+            <a:off x="6399390" y="0"/>
+            <a:ext cx="3886200" cy="5819775"/>
+          </a:xfrm>
+          <a:prstGeom prst="rect">
+            <a:avLst/>
+          </a:prstGeom>
+        </p:spPr>
+      </p:pic>
+    </p:spTree>
+    <p:extLst>
+      <p:ext uri="{BB962C8B-B14F-4D97-AF65-F5344CB8AC3E}">
+        <p14:creationId xmlns:p14="http://schemas.microsoft.com/office/powerpoint/2010/main" val="1889243304"/>
+      </p:ext>
+    </p:extLst>
+  </p:cSld>
+  <p:clrMapOvr>
+    <a:masterClrMapping/>
+  </p:clrMapOvr>
+</p:sld>
+</file>
+
+<file path=ppt/slides/slide16.xml><?xml version="1.0" encoding="utf-8"?>
+<p:sld xmlns:a="http://schemas.openxmlformats.org/drawingml/2006/main" xmlns:r="http://schemas.openxmlformats.org/officeDocument/2006/relationships" xmlns:p="http://schemas.openxmlformats.org/presentationml/2006/main">
+  <p:cSld>
+    <p:spTree>
+      <p:nvGrpSpPr>
+        <p:cNvPr id="1" name=""/>
+        <p:cNvGrpSpPr/>
+        <p:nvPr/>
+      </p:nvGrpSpPr>
+      <p:grpSpPr>
+        <a:xfrm>
+          <a:off x="0" y="0"/>
+          <a:ext cx="0" cy="0"/>
+          <a:chOff x="0" y="0"/>
+          <a:chExt cx="0" cy="0"/>
+        </a:xfrm>
+      </p:grpSpPr>
+      <p:sp>
+        <p:nvSpPr>
+          <p:cNvPr id="4" name="CuadroTexto 3">
+            <a:extLst>
+              <a:ext uri="{FF2B5EF4-FFF2-40B4-BE49-F238E27FC236}">
+                <a16:creationId xmlns:a16="http://schemas.microsoft.com/office/drawing/2014/main" id="{F06CDA0E-7A2F-4EBE-ABD3-0CE610FBF91D}"/>
+              </a:ext>
+            </a:extLst>
+          </p:cNvPr>
+          <p:cNvSpPr txBox="1"/>
+          <p:nvPr/>
+        </p:nvSpPr>
+        <p:spPr>
+          <a:xfrm>
+            <a:off x="5637225" y="4278493"/>
+            <a:ext cx="5990331" cy="1569660"/>
+          </a:xfrm>
+          <a:prstGeom prst="rect">
+            <a:avLst/>
+          </a:prstGeom>
+          <a:noFill/>
+        </p:spPr>
+        <p:txBody>
+          <a:bodyPr wrap="square">
+            <a:spAutoFit/>
+          </a:bodyPr>
+          <a:lstStyle/>
+          <a:p>
+            <a:r>
+              <a:rPr lang="es-ES" sz="1600" dirty="0">
+                <a:solidFill>
+                  <a:schemeClr val="bg2">
+                    <a:lumMod val="25000"/>
+                  </a:schemeClr>
+                </a:solidFill>
+                <a:latin typeface="Arial" panose="020B0604020202020204" pitchFamily="34" charset="0"/>
+                <a:cs typeface="Arial" panose="020B0604020202020204" pitchFamily="34" charset="0"/>
+              </a:rPr>
+              <a:t>El </a:t>
+            </a:r>
+            <a:r>
+              <a:rPr lang="es-ES" sz="3200" dirty="0">
+                <a:solidFill>
+                  <a:srgbClr val="5C739C"/>
+                </a:solidFill>
+                <a:latin typeface="Arial" panose="020B0604020202020204" pitchFamily="34" charset="0"/>
+                <a:cs typeface="Arial" panose="020B0604020202020204" pitchFamily="34" charset="0"/>
+              </a:rPr>
+              <a:t>porcentaje</a:t>
+            </a:r>
+            <a:r>
+              <a:rPr lang="es-ES" sz="1600" dirty="0">
+                <a:solidFill>
+                  <a:schemeClr val="bg2">
+                    <a:lumMod val="25000"/>
+                  </a:schemeClr>
+                </a:solidFill>
+                <a:latin typeface="Arial" panose="020B0604020202020204" pitchFamily="34" charset="0"/>
+                <a:cs typeface="Arial" panose="020B0604020202020204" pitchFamily="34" charset="0"/>
+              </a:rPr>
+              <a:t> en realidad no es relevante, si lo que queremos es simplemente disfrutar de una lectura, podemos quedar con </a:t>
+            </a:r>
+            <a:r>
+              <a:rPr lang="es-ES" sz="1600" dirty="0">
+                <a:solidFill>
+                  <a:srgbClr val="E83566"/>
+                </a:solidFill>
+                <a:latin typeface="Arial" panose="020B0604020202020204" pitchFamily="34" charset="0"/>
+                <a:cs typeface="Arial" panose="020B0604020202020204" pitchFamily="34" charset="0"/>
+              </a:rPr>
+              <a:t>la deuda </a:t>
+            </a:r>
+            <a:r>
+              <a:rPr lang="es-ES" sz="1600" dirty="0">
+                <a:solidFill>
+                  <a:schemeClr val="bg2">
+                    <a:lumMod val="25000"/>
+                  </a:schemeClr>
+                </a:solidFill>
+                <a:latin typeface="Arial" panose="020B0604020202020204" pitchFamily="34" charset="0"/>
+                <a:cs typeface="Arial" panose="020B0604020202020204" pitchFamily="34" charset="0"/>
+              </a:rPr>
+              <a:t>de las palabras que no conocemos, al consultarlas se abren nuevos caminos que posiblemente puedan ser recorridos</a:t>
+            </a:r>
+          </a:p>
+        </p:txBody>
+      </p:sp>
+      <p:pic>
+        <p:nvPicPr>
+          <p:cNvPr id="6" name="Imagen 5" descr="Diagrama&#10;&#10;Descripción generada automáticamente">
+            <a:extLst>
+              <a:ext uri="{FF2B5EF4-FFF2-40B4-BE49-F238E27FC236}">
+                <a16:creationId xmlns:a16="http://schemas.microsoft.com/office/drawing/2014/main" id="{77A86576-FADC-446F-86D5-4773F597DFE7}"/>
+              </a:ext>
+            </a:extLst>
+          </p:cNvPr>
+          <p:cNvPicPr>
+            <a:picLocks noChangeAspect="1"/>
+          </p:cNvPicPr>
+          <p:nvPr/>
+        </p:nvPicPr>
+        <p:blipFill>
+          <a:blip r:embed="rId2">
+            <a:duotone>
+              <a:schemeClr val="accent1">
+                <a:shade val="45000"/>
+                <a:satMod val="135000"/>
+              </a:schemeClr>
+              <a:prstClr val="white"/>
+            </a:duotone>
+            <a:extLst>
+              <a:ext uri="{BEBA8EAE-BF5A-486C-A8C5-ECC9F3942E4B}">
+                <a14:imgProps xmlns:a14="http://schemas.microsoft.com/office/drawing/2010/main">
+                  <a14:imgLayer r:embed="rId3">
+                    <a14:imgEffect>
+                      <a14:brightnessContrast bright="20000" contrast="-40000"/>
+                    </a14:imgEffect>
+                  </a14:imgLayer>
+                </a14:imgProps>
+              </a:ext>
+            </a:extLst>
+          </a:blip>
+          <a:stretch>
+            <a:fillRect/>
+          </a:stretch>
+        </p:blipFill>
+        <p:spPr>
+          <a:xfrm rot="5400000">
+            <a:off x="854346" y="-301186"/>
+            <a:ext cx="4210758" cy="5558201"/>
+          </a:xfrm>
+          <a:prstGeom prst="rect">
+            <a:avLst/>
+          </a:prstGeom>
+        </p:spPr>
+      </p:pic>
+    </p:spTree>
+    <p:extLst>
+      <p:ext uri="{BB962C8B-B14F-4D97-AF65-F5344CB8AC3E}">
+        <p14:creationId xmlns:p14="http://schemas.microsoft.com/office/powerpoint/2010/main" val="209153584"/>
+      </p:ext>
+    </p:extLst>
+  </p:cSld>
+  <p:clrMapOvr>
+    <a:masterClrMapping/>
+  </p:clrMapOvr>
+</p:sld>
+</file>
+
+<file path=ppt/slides/slide17.xml><?xml version="1.0" encoding="utf-8"?>
+<p:sld xmlns:a="http://schemas.openxmlformats.org/drawingml/2006/main" xmlns:r="http://schemas.openxmlformats.org/officeDocument/2006/relationships" xmlns:p="http://schemas.openxmlformats.org/presentationml/2006/main">
+  <p:cSld>
+    <p:spTree>
+      <p:nvGrpSpPr>
+        <p:cNvPr id="1" name=""/>
+        <p:cNvGrpSpPr/>
+        <p:nvPr/>
+      </p:nvGrpSpPr>
+      <p:grpSpPr>
+        <a:xfrm>
+          <a:off x="0" y="0"/>
+          <a:ext cx="0" cy="0"/>
+          <a:chOff x="0" y="0"/>
+          <a:chExt cx="0" cy="0"/>
+        </a:xfrm>
+      </p:grpSpPr>
+      <p:sp>
+        <p:nvSpPr>
+          <p:cNvPr id="6" name="CuadroTexto 5">
+            <a:extLst>
+              <a:ext uri="{FF2B5EF4-FFF2-40B4-BE49-F238E27FC236}">
+                <a16:creationId xmlns:a16="http://schemas.microsoft.com/office/drawing/2014/main" id="{E3FDDDED-6EE0-4156-AEB3-DECFE162B23A}"/>
+              </a:ext>
+            </a:extLst>
+          </p:cNvPr>
+          <p:cNvSpPr txBox="1"/>
+          <p:nvPr/>
+        </p:nvSpPr>
+        <p:spPr>
+          <a:xfrm rot="20291011">
+            <a:off x="1265288" y="1178296"/>
+            <a:ext cx="2460978" cy="4339650"/>
+          </a:xfrm>
+          <a:prstGeom prst="rect">
+            <a:avLst/>
+          </a:prstGeom>
+          <a:noFill/>
+        </p:spPr>
+        <p:txBody>
+          <a:bodyPr wrap="square" rtlCol="0">
+            <a:spAutoFit/>
+          </a:bodyPr>
+          <a:lstStyle/>
+          <a:p>
+            <a:r>
+              <a:rPr lang="es-CO" sz="13800" b="1" dirty="0" err="1">
+                <a:ln w="19050">
+                  <a:solidFill>
+                    <a:srgbClr val="5C739C"/>
+                  </a:solidFill>
+                </a:ln>
+                <a:noFill/>
+                <a:latin typeface="Arial" panose="020B0604020202020204" pitchFamily="34" charset="0"/>
+                <a:cs typeface="Arial" panose="020B0604020202020204" pitchFamily="34" charset="0"/>
+              </a:rPr>
+              <a:t>Ses</a:t>
+            </a:r>
+            <a:endParaRPr lang="es-CO" sz="102800" b="1" dirty="0">
+              <a:ln w="19050">
+                <a:solidFill>
+                  <a:srgbClr val="5C739C"/>
+                </a:solidFill>
+              </a:ln>
+              <a:noFill/>
+              <a:latin typeface="Arial" panose="020B0604020202020204" pitchFamily="34" charset="0"/>
+              <a:cs typeface="Arial" panose="020B0604020202020204" pitchFamily="34" charset="0"/>
+            </a:endParaRPr>
+          </a:p>
+        </p:txBody>
+      </p:sp>
+      <p:sp>
+        <p:nvSpPr>
+          <p:cNvPr id="7" name="CuadroTexto 6">
+            <a:extLst>
+              <a:ext uri="{FF2B5EF4-FFF2-40B4-BE49-F238E27FC236}">
+                <a16:creationId xmlns:a16="http://schemas.microsoft.com/office/drawing/2014/main" id="{484163F7-F03B-4A5E-9EC8-8DD2368AF0E6}"/>
+              </a:ext>
+            </a:extLst>
+          </p:cNvPr>
+          <p:cNvSpPr txBox="1"/>
+          <p:nvPr/>
+        </p:nvSpPr>
+        <p:spPr>
+          <a:xfrm rot="20291011">
+            <a:off x="2653651" y="2110821"/>
+            <a:ext cx="2460978" cy="1446550"/>
+          </a:xfrm>
+          <a:prstGeom prst="rect">
+            <a:avLst/>
+          </a:prstGeom>
+          <a:noFill/>
+        </p:spPr>
+        <p:txBody>
+          <a:bodyPr wrap="square" rtlCol="0">
+            <a:spAutoFit/>
+          </a:bodyPr>
+          <a:lstStyle/>
+          <a:p>
+            <a:r>
+              <a:rPr lang="es-CO" sz="8800" b="1" dirty="0" err="1">
+                <a:ln w="19050">
+                  <a:solidFill>
+                    <a:srgbClr val="5C739C"/>
+                  </a:solidFill>
+                </a:ln>
+                <a:noFill/>
+                <a:latin typeface="Arial" panose="020B0604020202020204" pitchFamily="34" charset="0"/>
+                <a:cs typeface="Arial" panose="020B0604020202020204" pitchFamily="34" charset="0"/>
+              </a:rPr>
+              <a:t>go</a:t>
+            </a:r>
+            <a:endParaRPr lang="es-CO" sz="59500" b="1" dirty="0">
+              <a:ln w="19050">
+                <a:solidFill>
+                  <a:srgbClr val="5C739C"/>
+                </a:solidFill>
+              </a:ln>
+              <a:noFill/>
+              <a:latin typeface="Arial" panose="020B0604020202020204" pitchFamily="34" charset="0"/>
+              <a:cs typeface="Arial" panose="020B0604020202020204" pitchFamily="34" charset="0"/>
+            </a:endParaRPr>
+          </a:p>
+        </p:txBody>
+      </p:sp>
+      <p:pic>
+        <p:nvPicPr>
+          <p:cNvPr id="5" name="Imagen 4">
+            <a:extLst>
+              <a:ext uri="{FF2B5EF4-FFF2-40B4-BE49-F238E27FC236}">
+                <a16:creationId xmlns:a16="http://schemas.microsoft.com/office/drawing/2014/main" id="{384C26ED-F65D-5D41-8438-47B783421CE5}"/>
               </a:ext>
             </a:extLst>
           </p:cNvPr>
@@ -2018,9 +3447,437 @@
           </a:stretch>
         </p:blipFill>
         <p:spPr>
-          <a:xfrm>
-            <a:off x="0" y="8306"/>
-            <a:ext cx="12192000" cy="6841388"/>
+          <a:xfrm rot="16200000">
+            <a:off x="6592236" y="4519334"/>
+            <a:ext cx="571500" cy="152400"/>
+          </a:xfrm>
+          <a:prstGeom prst="rect">
+            <a:avLst/>
+          </a:prstGeom>
+        </p:spPr>
+      </p:pic>
+      <p:sp>
+        <p:nvSpPr>
+          <p:cNvPr id="3" name="CuadroTexto 2">
+            <a:extLst>
+              <a:ext uri="{FF2B5EF4-FFF2-40B4-BE49-F238E27FC236}">
+                <a16:creationId xmlns:a16="http://schemas.microsoft.com/office/drawing/2014/main" id="{EFA49BB1-7AC6-4EFE-BAC7-0EB9A368D380}"/>
+              </a:ext>
+            </a:extLst>
+          </p:cNvPr>
+          <p:cNvSpPr txBox="1"/>
+          <p:nvPr/>
+        </p:nvSpPr>
+        <p:spPr>
+          <a:xfrm rot="20291011">
+            <a:off x="1076311" y="2328130"/>
+            <a:ext cx="2460978" cy="1446550"/>
+          </a:xfrm>
+          <a:prstGeom prst="rect">
+            <a:avLst/>
+          </a:prstGeom>
+          <a:noFill/>
+        </p:spPr>
+        <p:txBody>
+          <a:bodyPr wrap="square" rtlCol="0">
+            <a:spAutoFit/>
+          </a:bodyPr>
+          <a:lstStyle/>
+          <a:p>
+            <a:r>
+              <a:rPr lang="es-CO" sz="8800" b="1" dirty="0" err="1">
+                <a:ln w="19050">
+                  <a:solidFill>
+                    <a:srgbClr val="E83566"/>
+                  </a:solidFill>
+                </a:ln>
+                <a:noFill/>
+                <a:latin typeface="Arial" panose="020B0604020202020204" pitchFamily="34" charset="0"/>
+                <a:cs typeface="Arial" panose="020B0604020202020204" pitchFamily="34" charset="0"/>
+              </a:rPr>
+              <a:t>Ses</a:t>
+            </a:r>
+            <a:endParaRPr lang="es-CO" sz="59500" b="1" dirty="0">
+              <a:ln w="19050">
+                <a:solidFill>
+                  <a:srgbClr val="E83566"/>
+                </a:solidFill>
+              </a:ln>
+              <a:noFill/>
+              <a:latin typeface="Arial" panose="020B0604020202020204" pitchFamily="34" charset="0"/>
+              <a:cs typeface="Arial" panose="020B0604020202020204" pitchFamily="34" charset="0"/>
+            </a:endParaRPr>
+          </a:p>
+        </p:txBody>
+      </p:sp>
+      <p:sp>
+        <p:nvSpPr>
+          <p:cNvPr id="4" name="CuadroTexto 3">
+            <a:extLst>
+              <a:ext uri="{FF2B5EF4-FFF2-40B4-BE49-F238E27FC236}">
+                <a16:creationId xmlns:a16="http://schemas.microsoft.com/office/drawing/2014/main" id="{9AB04B9A-3BC4-407E-8B36-EE2B6A91ACA3}"/>
+              </a:ext>
+            </a:extLst>
+          </p:cNvPr>
+          <p:cNvSpPr txBox="1"/>
+          <p:nvPr/>
+        </p:nvSpPr>
+        <p:spPr>
+          <a:xfrm rot="20291011">
+            <a:off x="1979254" y="3001513"/>
+            <a:ext cx="2460978" cy="1446550"/>
+          </a:xfrm>
+          <a:prstGeom prst="rect">
+            <a:avLst/>
+          </a:prstGeom>
+          <a:noFill/>
+        </p:spPr>
+        <p:txBody>
+          <a:bodyPr wrap="square" rtlCol="0">
+            <a:spAutoFit/>
+          </a:bodyPr>
+          <a:lstStyle/>
+          <a:p>
+            <a:r>
+              <a:rPr lang="es-CO" sz="8800" b="1" dirty="0" err="1">
+                <a:ln w="19050">
+                  <a:solidFill>
+                    <a:srgbClr val="E83566"/>
+                  </a:solidFill>
+                </a:ln>
+                <a:noFill/>
+                <a:latin typeface="Arial" panose="020B0604020202020204" pitchFamily="34" charset="0"/>
+                <a:cs typeface="Arial" panose="020B0604020202020204" pitchFamily="34" charset="0"/>
+              </a:rPr>
+              <a:t>go</a:t>
+            </a:r>
+            <a:endParaRPr lang="es-CO" sz="59500" b="1" dirty="0">
+              <a:ln w="19050">
+                <a:solidFill>
+                  <a:srgbClr val="E83566"/>
+                </a:solidFill>
+              </a:ln>
+              <a:noFill/>
+              <a:latin typeface="Arial" panose="020B0604020202020204" pitchFamily="34" charset="0"/>
+              <a:cs typeface="Arial" panose="020B0604020202020204" pitchFamily="34" charset="0"/>
+            </a:endParaRPr>
+          </a:p>
+        </p:txBody>
+      </p:sp>
+      <p:sp>
+        <p:nvSpPr>
+          <p:cNvPr id="8" name="CuadroTexto 7">
+            <a:extLst>
+              <a:ext uri="{FF2B5EF4-FFF2-40B4-BE49-F238E27FC236}">
+                <a16:creationId xmlns:a16="http://schemas.microsoft.com/office/drawing/2014/main" id="{5A6A5B12-D7A5-4517-BFB4-E14FBA09EB6E}"/>
+              </a:ext>
+            </a:extLst>
+          </p:cNvPr>
+          <p:cNvSpPr txBox="1"/>
+          <p:nvPr/>
+        </p:nvSpPr>
+        <p:spPr>
+          <a:xfrm>
+            <a:off x="9220466" y="4853554"/>
+            <a:ext cx="2933938" cy="646331"/>
+          </a:xfrm>
+          <a:prstGeom prst="rect">
+            <a:avLst/>
+          </a:prstGeom>
+          <a:noFill/>
+        </p:spPr>
+        <p:txBody>
+          <a:bodyPr wrap="square">
+            <a:spAutoFit/>
+          </a:bodyPr>
+          <a:lstStyle/>
+          <a:p>
+            <a:r>
+              <a:rPr lang="es-ES" dirty="0">
+                <a:solidFill>
+                  <a:schemeClr val="bg2">
+                    <a:lumMod val="50000"/>
+                  </a:schemeClr>
+                </a:solidFill>
+                <a:latin typeface="Arial" panose="020B0604020202020204" pitchFamily="34" charset="0"/>
+                <a:cs typeface="Arial" panose="020B0604020202020204" pitchFamily="34" charset="0"/>
+              </a:rPr>
+              <a:t>Experto entusiasta de cualquier tipo</a:t>
+            </a:r>
+            <a:endParaRPr lang="es-CO" dirty="0">
+              <a:solidFill>
+                <a:schemeClr val="bg2">
+                  <a:lumMod val="50000"/>
+                </a:schemeClr>
+              </a:solidFill>
+              <a:latin typeface="Arial" panose="020B0604020202020204" pitchFamily="34" charset="0"/>
+              <a:cs typeface="Arial" panose="020B0604020202020204" pitchFamily="34" charset="0"/>
+            </a:endParaRPr>
+          </a:p>
+        </p:txBody>
+      </p:sp>
+      <p:sp>
+        <p:nvSpPr>
+          <p:cNvPr id="9" name="CuadroTexto 8">
+            <a:extLst>
+              <a:ext uri="{FF2B5EF4-FFF2-40B4-BE49-F238E27FC236}">
+                <a16:creationId xmlns:a16="http://schemas.microsoft.com/office/drawing/2014/main" id="{98D42AF6-9067-499F-8660-3CE242F7332A}"/>
+              </a:ext>
+            </a:extLst>
+          </p:cNvPr>
+          <p:cNvSpPr txBox="1"/>
+          <p:nvPr/>
+        </p:nvSpPr>
+        <p:spPr>
+          <a:xfrm>
+            <a:off x="3303011" y="4580389"/>
+            <a:ext cx="6458914" cy="2215991"/>
+          </a:xfrm>
+          <a:prstGeom prst="rect">
+            <a:avLst/>
+          </a:prstGeom>
+          <a:noFill/>
+        </p:spPr>
+        <p:txBody>
+          <a:bodyPr wrap="square" rtlCol="0">
+            <a:spAutoFit/>
+          </a:bodyPr>
+          <a:lstStyle/>
+          <a:p>
+            <a:r>
+              <a:rPr lang="es-CO" sz="13800" b="1" dirty="0">
+                <a:ln w="19050">
+                  <a:solidFill>
+                    <a:srgbClr val="5C739C"/>
+                  </a:solidFill>
+                </a:ln>
+                <a:noFill/>
+                <a:latin typeface="Arial" panose="020B0604020202020204" pitchFamily="34" charset="0"/>
+                <a:cs typeface="Arial" panose="020B0604020202020204" pitchFamily="34" charset="0"/>
+              </a:rPr>
+              <a:t>Hacker</a:t>
+            </a:r>
+            <a:endParaRPr lang="es-CO" sz="102800" b="1" dirty="0">
+              <a:ln w="19050">
+                <a:solidFill>
+                  <a:srgbClr val="5C739C"/>
+                </a:solidFill>
+              </a:ln>
+              <a:noFill/>
+              <a:latin typeface="Arial" panose="020B0604020202020204" pitchFamily="34" charset="0"/>
+              <a:cs typeface="Arial" panose="020B0604020202020204" pitchFamily="34" charset="0"/>
+            </a:endParaRPr>
+          </a:p>
+        </p:txBody>
+      </p:sp>
+      <p:sp>
+        <p:nvSpPr>
+          <p:cNvPr id="10" name="CuadroTexto 9">
+            <a:extLst>
+              <a:ext uri="{FF2B5EF4-FFF2-40B4-BE49-F238E27FC236}">
+                <a16:creationId xmlns:a16="http://schemas.microsoft.com/office/drawing/2014/main" id="{EBD0FDB7-F3EB-4D6C-B163-C13C09C1DDFD}"/>
+              </a:ext>
+            </a:extLst>
+          </p:cNvPr>
+          <p:cNvSpPr txBox="1"/>
+          <p:nvPr/>
+        </p:nvSpPr>
+        <p:spPr>
+          <a:xfrm>
+            <a:off x="4888257" y="4881284"/>
+            <a:ext cx="3979459" cy="1446550"/>
+          </a:xfrm>
+          <a:prstGeom prst="rect">
+            <a:avLst/>
+          </a:prstGeom>
+          <a:noFill/>
+        </p:spPr>
+        <p:txBody>
+          <a:bodyPr wrap="square" rtlCol="0">
+            <a:spAutoFit/>
+          </a:bodyPr>
+          <a:lstStyle/>
+          <a:p>
+            <a:r>
+              <a:rPr lang="es-CO" sz="8800" b="1" dirty="0">
+                <a:ln w="19050">
+                  <a:solidFill>
+                    <a:srgbClr val="5C739C"/>
+                  </a:solidFill>
+                </a:ln>
+                <a:noFill/>
+                <a:latin typeface="Arial" panose="020B0604020202020204" pitchFamily="34" charset="0"/>
+                <a:cs typeface="Arial" panose="020B0604020202020204" pitchFamily="34" charset="0"/>
+              </a:rPr>
+              <a:t>H</a:t>
+            </a:r>
+            <a:r>
+              <a:rPr lang="es-CO" sz="8800" b="1" dirty="0">
+                <a:ln w="19050">
+                  <a:noFill/>
+                </a:ln>
+                <a:solidFill>
+                  <a:srgbClr val="E83566"/>
+                </a:solidFill>
+                <a:latin typeface="Arial" panose="020B0604020202020204" pitchFamily="34" charset="0"/>
+                <a:cs typeface="Arial" panose="020B0604020202020204" pitchFamily="34" charset="0"/>
+              </a:rPr>
+              <a:t>a</a:t>
+            </a:r>
+            <a:r>
+              <a:rPr lang="es-CO" sz="8800" b="1" dirty="0">
+                <a:ln w="19050">
+                  <a:solidFill>
+                    <a:srgbClr val="5C739C"/>
+                  </a:solidFill>
+                </a:ln>
+                <a:noFill/>
+                <a:latin typeface="Arial" panose="020B0604020202020204" pitchFamily="34" charset="0"/>
+                <a:cs typeface="Arial" panose="020B0604020202020204" pitchFamily="34" charset="0"/>
+              </a:rPr>
+              <a:t>cker</a:t>
+            </a:r>
+            <a:endParaRPr lang="es-CO" sz="59500" b="1" dirty="0">
+              <a:ln w="19050">
+                <a:solidFill>
+                  <a:srgbClr val="5C739C"/>
+                </a:solidFill>
+              </a:ln>
+              <a:noFill/>
+              <a:latin typeface="Arial" panose="020B0604020202020204" pitchFamily="34" charset="0"/>
+              <a:cs typeface="Arial" panose="020B0604020202020204" pitchFamily="34" charset="0"/>
+            </a:endParaRPr>
+          </a:p>
+        </p:txBody>
+      </p:sp>
+      <p:sp>
+        <p:nvSpPr>
+          <p:cNvPr id="11" name="CuadroTexto 10">
+            <a:extLst>
+              <a:ext uri="{FF2B5EF4-FFF2-40B4-BE49-F238E27FC236}">
+                <a16:creationId xmlns:a16="http://schemas.microsoft.com/office/drawing/2014/main" id="{49A50817-6237-4158-BF5E-986EF483F56D}"/>
+              </a:ext>
+            </a:extLst>
+          </p:cNvPr>
+          <p:cNvSpPr txBox="1"/>
+          <p:nvPr/>
+        </p:nvSpPr>
+        <p:spPr>
+          <a:xfrm>
+            <a:off x="4287308" y="2333939"/>
+            <a:ext cx="2933938" cy="923330"/>
+          </a:xfrm>
+          <a:prstGeom prst="rect">
+            <a:avLst/>
+          </a:prstGeom>
+          <a:noFill/>
+        </p:spPr>
+        <p:txBody>
+          <a:bodyPr wrap="square">
+            <a:spAutoFit/>
+          </a:bodyPr>
+          <a:lstStyle/>
+          <a:p>
+            <a:r>
+              <a:rPr lang="es-ES" dirty="0">
+                <a:solidFill>
+                  <a:schemeClr val="bg2">
+                    <a:lumMod val="50000"/>
+                  </a:schemeClr>
+                </a:solidFill>
+                <a:latin typeface="Arial" panose="020B0604020202020204" pitchFamily="34" charset="0"/>
+                <a:cs typeface="Arial" panose="020B0604020202020204" pitchFamily="34" charset="0"/>
+              </a:rPr>
+              <a:t>Unilateral, carece de un punto de vista neutral o no tiene una mente abierta</a:t>
+            </a:r>
+            <a:endParaRPr lang="es-CO" dirty="0">
+              <a:solidFill>
+                <a:schemeClr val="bg2">
+                  <a:lumMod val="50000"/>
+                </a:schemeClr>
+              </a:solidFill>
+              <a:latin typeface="Arial" panose="020B0604020202020204" pitchFamily="34" charset="0"/>
+              <a:cs typeface="Arial" panose="020B0604020202020204" pitchFamily="34" charset="0"/>
+            </a:endParaRPr>
+          </a:p>
+        </p:txBody>
+      </p:sp>
+      <p:sp>
+        <p:nvSpPr>
+          <p:cNvPr id="12" name="CuadroTexto 11">
+            <a:extLst>
+              <a:ext uri="{FF2B5EF4-FFF2-40B4-BE49-F238E27FC236}">
+                <a16:creationId xmlns:a16="http://schemas.microsoft.com/office/drawing/2014/main" id="{60C8AFD2-0E13-4D1F-9819-A82AA2BE7A3A}"/>
+              </a:ext>
+            </a:extLst>
+          </p:cNvPr>
+          <p:cNvSpPr txBox="1"/>
+          <p:nvPr/>
+        </p:nvSpPr>
+        <p:spPr>
+          <a:xfrm>
+            <a:off x="4188556" y="6367733"/>
+            <a:ext cx="1399233" cy="369332"/>
+          </a:xfrm>
+          <a:prstGeom prst="rect">
+            <a:avLst/>
+          </a:prstGeom>
+          <a:noFill/>
+        </p:spPr>
+        <p:txBody>
+          <a:bodyPr wrap="square">
+            <a:spAutoFit/>
+          </a:bodyPr>
+          <a:lstStyle/>
+          <a:p>
+            <a:r>
+              <a:rPr lang="es-ES" strike="sngStrike" dirty="0">
+                <a:solidFill>
+                  <a:schemeClr val="bg2">
+                    <a:lumMod val="75000"/>
+                  </a:schemeClr>
+                </a:solidFill>
+                <a:latin typeface="Arial" panose="020B0604020202020204" pitchFamily="34" charset="0"/>
+                <a:cs typeface="Arial" panose="020B0604020202020204" pitchFamily="34" charset="0"/>
+              </a:rPr>
+              <a:t>cacharrero</a:t>
+            </a:r>
+            <a:endParaRPr lang="es-CO" strike="sngStrike" dirty="0">
+              <a:solidFill>
+                <a:schemeClr val="bg2">
+                  <a:lumMod val="75000"/>
+                </a:schemeClr>
+              </a:solidFill>
+              <a:latin typeface="Arial" panose="020B0604020202020204" pitchFamily="34" charset="0"/>
+              <a:cs typeface="Arial" panose="020B0604020202020204" pitchFamily="34" charset="0"/>
+            </a:endParaRPr>
+          </a:p>
+        </p:txBody>
+      </p:sp>
+      <p:pic>
+        <p:nvPicPr>
+          <p:cNvPr id="13" name="Imagen 12">
+            <a:extLst>
+              <a:ext uri="{FF2B5EF4-FFF2-40B4-BE49-F238E27FC236}">
+                <a16:creationId xmlns:a16="http://schemas.microsoft.com/office/drawing/2014/main" id="{9C2C63E8-9094-4F14-A87A-3CC656A3E220}"/>
+              </a:ext>
+            </a:extLst>
+          </p:cNvPr>
+          <p:cNvPicPr>
+            <a:picLocks noChangeAspect="1"/>
+          </p:cNvPicPr>
+          <p:nvPr/>
+        </p:nvPicPr>
+        <p:blipFill>
+          <a:blip r:embed="rId3"/>
+          <a:stretch>
+            <a:fillRect/>
+          </a:stretch>
+        </p:blipFill>
+        <p:spPr>
+          <a:xfrm>
+            <a:off x="719267" y="2304909"/>
+            <a:ext cx="205029" cy="173485"/>
           </a:xfrm>
           <a:prstGeom prst="rect">
             <a:avLst/>
@@ -2030,7 +3887,411 @@
     </p:spTree>
     <p:extLst>
       <p:ext uri="{BB962C8B-B14F-4D97-AF65-F5344CB8AC3E}">
-        <p14:creationId xmlns:p14="http://schemas.microsoft.com/office/powerpoint/2010/main" val="4076813880"/>
+        <p14:creationId xmlns:p14="http://schemas.microsoft.com/office/powerpoint/2010/main" val="696006659"/>
+      </p:ext>
+    </p:extLst>
+  </p:cSld>
+  <p:clrMapOvr>
+    <a:masterClrMapping/>
+  </p:clrMapOvr>
+</p:sld>
+</file>
+
+<file path=ppt/slides/slide18.xml><?xml version="1.0" encoding="utf-8"?>
+<p:sld xmlns:a="http://schemas.openxmlformats.org/drawingml/2006/main" xmlns:r="http://schemas.openxmlformats.org/officeDocument/2006/relationships" xmlns:p="http://schemas.openxmlformats.org/presentationml/2006/main">
+  <p:cSld>
+    <p:spTree>
+      <p:nvGrpSpPr>
+        <p:cNvPr id="1" name=""/>
+        <p:cNvGrpSpPr/>
+        <p:nvPr/>
+      </p:nvGrpSpPr>
+      <p:grpSpPr>
+        <a:xfrm>
+          <a:off x="0" y="0"/>
+          <a:ext cx="0" cy="0"/>
+          <a:chOff x="0" y="0"/>
+          <a:chExt cx="0" cy="0"/>
+        </a:xfrm>
+      </p:grpSpPr>
+      <p:pic>
+        <p:nvPicPr>
+          <p:cNvPr id="5" name="Imagen 4">
+            <a:extLst>
+              <a:ext uri="{FF2B5EF4-FFF2-40B4-BE49-F238E27FC236}">
+                <a16:creationId xmlns:a16="http://schemas.microsoft.com/office/drawing/2014/main" id="{384C26ED-F65D-5D41-8438-47B783421CE5}"/>
+              </a:ext>
+            </a:extLst>
+          </p:cNvPr>
+          <p:cNvPicPr>
+            <a:picLocks noChangeAspect="1"/>
+          </p:cNvPicPr>
+          <p:nvPr/>
+        </p:nvPicPr>
+        <p:blipFill>
+          <a:blip r:embed="rId2"/>
+          <a:stretch>
+            <a:fillRect/>
+          </a:stretch>
+        </p:blipFill>
+        <p:spPr>
+          <a:xfrm rot="16200000">
+            <a:off x="2289723" y="2543633"/>
+            <a:ext cx="571500" cy="152400"/>
+          </a:xfrm>
+          <a:prstGeom prst="rect">
+            <a:avLst/>
+          </a:prstGeom>
+        </p:spPr>
+      </p:pic>
+      <p:pic>
+        <p:nvPicPr>
+          <p:cNvPr id="19" name="Imagen 18">
+            <a:extLst>
+              <a:ext uri="{FF2B5EF4-FFF2-40B4-BE49-F238E27FC236}">
+                <a16:creationId xmlns:a16="http://schemas.microsoft.com/office/drawing/2014/main" id="{1B17433A-7D69-471E-B131-1E1813A6BCF6}"/>
+              </a:ext>
+            </a:extLst>
+          </p:cNvPr>
+          <p:cNvPicPr>
+            <a:picLocks noChangeAspect="1"/>
+          </p:cNvPicPr>
+          <p:nvPr/>
+        </p:nvPicPr>
+        <p:blipFill>
+          <a:blip r:embed="rId3"/>
+          <a:stretch>
+            <a:fillRect/>
+          </a:stretch>
+        </p:blipFill>
+        <p:spPr>
+          <a:xfrm>
+            <a:off x="6491111" y="5269027"/>
+            <a:ext cx="205029" cy="173485"/>
+          </a:xfrm>
+          <a:prstGeom prst="rect">
+            <a:avLst/>
+          </a:prstGeom>
+        </p:spPr>
+      </p:pic>
+      <p:sp>
+        <p:nvSpPr>
+          <p:cNvPr id="4" name="CuadroTexto 3">
+            <a:extLst>
+              <a:ext uri="{FF2B5EF4-FFF2-40B4-BE49-F238E27FC236}">
+                <a16:creationId xmlns:a16="http://schemas.microsoft.com/office/drawing/2014/main" id="{1CD0B001-368B-4876-BA4E-2DC4A68E0E87}"/>
+              </a:ext>
+            </a:extLst>
+          </p:cNvPr>
+          <p:cNvSpPr txBox="1"/>
+          <p:nvPr/>
+        </p:nvSpPr>
+        <p:spPr>
+          <a:xfrm>
+            <a:off x="2402927" y="3344612"/>
+            <a:ext cx="3083473" cy="1477328"/>
+          </a:xfrm>
+          <a:prstGeom prst="rect">
+            <a:avLst/>
+          </a:prstGeom>
+          <a:noFill/>
+        </p:spPr>
+        <p:txBody>
+          <a:bodyPr wrap="square">
+            <a:spAutoFit/>
+          </a:bodyPr>
+          <a:lstStyle/>
+          <a:p>
+            <a:r>
+              <a:rPr lang="es-ES" dirty="0">
+                <a:solidFill>
+                  <a:schemeClr val="bg2">
+                    <a:lumMod val="75000"/>
+                  </a:schemeClr>
+                </a:solidFill>
+                <a:latin typeface="Arial" panose="020B0604020202020204" pitchFamily="34" charset="0"/>
+                <a:ea typeface="Cambria Math" panose="02040503050406030204" pitchFamily="18" charset="0"/>
+                <a:cs typeface="Arial" panose="020B0604020202020204" pitchFamily="34" charset="0"/>
+              </a:rPr>
+              <a:t>El efecto del exceso de confianza prescinde de la diferencia entre lo que la gente sabe realmente y lo que cree saber</a:t>
+            </a:r>
+          </a:p>
+        </p:txBody>
+      </p:sp>
+      <p:sp>
+        <p:nvSpPr>
+          <p:cNvPr id="6" name="CuadroTexto 5">
+            <a:extLst>
+              <a:ext uri="{FF2B5EF4-FFF2-40B4-BE49-F238E27FC236}">
+                <a16:creationId xmlns:a16="http://schemas.microsoft.com/office/drawing/2014/main" id="{4796EDEA-88B2-4D26-8BF3-324D95CF383C}"/>
+              </a:ext>
+            </a:extLst>
+          </p:cNvPr>
+          <p:cNvSpPr txBox="1"/>
+          <p:nvPr/>
+        </p:nvSpPr>
+        <p:spPr>
+          <a:xfrm>
+            <a:off x="2402927" y="2932770"/>
+            <a:ext cx="3083473" cy="430887"/>
+          </a:xfrm>
+          <a:prstGeom prst="rect">
+            <a:avLst/>
+          </a:prstGeom>
+          <a:noFill/>
+        </p:spPr>
+        <p:txBody>
+          <a:bodyPr wrap="square" rtlCol="0">
+            <a:spAutoFit/>
+          </a:bodyPr>
+          <a:lstStyle/>
+          <a:p>
+            <a:r>
+              <a:rPr lang="es-CO" sz="2200" b="1" dirty="0">
+                <a:solidFill>
+                  <a:schemeClr val="accent1"/>
+                </a:solidFill>
+                <a:latin typeface="Arial" panose="020B0604020202020204" pitchFamily="34" charset="0"/>
+                <a:cs typeface="Arial" panose="020B0604020202020204" pitchFamily="34" charset="0"/>
+              </a:rPr>
+              <a:t>Exceso de confianza</a:t>
+            </a:r>
+          </a:p>
+        </p:txBody>
+      </p:sp>
+      <p:pic>
+        <p:nvPicPr>
+          <p:cNvPr id="7" name="Imagen 6">
+            <a:extLst>
+              <a:ext uri="{FF2B5EF4-FFF2-40B4-BE49-F238E27FC236}">
+                <a16:creationId xmlns:a16="http://schemas.microsoft.com/office/drawing/2014/main" id="{AACE85AC-9A2B-4B2E-9A6B-A9094A45ACD7}"/>
+              </a:ext>
+            </a:extLst>
+          </p:cNvPr>
+          <p:cNvPicPr>
+            <a:picLocks noChangeAspect="1"/>
+          </p:cNvPicPr>
+          <p:nvPr/>
+        </p:nvPicPr>
+        <p:blipFill>
+          <a:blip r:embed="rId3"/>
+          <a:stretch>
+            <a:fillRect/>
+          </a:stretch>
+        </p:blipFill>
+        <p:spPr>
+          <a:xfrm>
+            <a:off x="2161905" y="3070571"/>
+            <a:ext cx="205029" cy="173485"/>
+          </a:xfrm>
+          <a:prstGeom prst="rect">
+            <a:avLst/>
+          </a:prstGeom>
+        </p:spPr>
+      </p:pic>
+      <p:sp>
+        <p:nvSpPr>
+          <p:cNvPr id="8" name="CuadroTexto 7">
+            <a:extLst>
+              <a:ext uri="{FF2B5EF4-FFF2-40B4-BE49-F238E27FC236}">
+                <a16:creationId xmlns:a16="http://schemas.microsoft.com/office/drawing/2014/main" id="{C1450177-D953-452D-B07D-EC5341403EBD}"/>
+              </a:ext>
+            </a:extLst>
+          </p:cNvPr>
+          <p:cNvSpPr txBox="1"/>
+          <p:nvPr/>
+        </p:nvSpPr>
+        <p:spPr>
+          <a:xfrm>
+            <a:off x="6409174" y="1440369"/>
+            <a:ext cx="3208959" cy="3693319"/>
+          </a:xfrm>
+          <a:prstGeom prst="rect">
+            <a:avLst/>
+          </a:prstGeom>
+          <a:noFill/>
+        </p:spPr>
+        <p:txBody>
+          <a:bodyPr wrap="square">
+            <a:spAutoFit/>
+          </a:bodyPr>
+          <a:lstStyle/>
+          <a:p>
+            <a:r>
+              <a:rPr lang="es-ES" dirty="0">
+                <a:solidFill>
+                  <a:schemeClr val="bg2">
+                    <a:lumMod val="75000"/>
+                  </a:schemeClr>
+                </a:solidFill>
+                <a:latin typeface="Arial" panose="020B0604020202020204" pitchFamily="34" charset="0"/>
+                <a:ea typeface="Cambria Math" panose="02040503050406030204" pitchFamily="18" charset="0"/>
+                <a:cs typeface="Arial" panose="020B0604020202020204" pitchFamily="34" charset="0"/>
+              </a:rPr>
+              <a:t>Equivocarse es humano. Resulta más grave el hecho de que, en presencia de una autoridad, hagamos retroceder un paso el pensamiento independiente. Somos menos cuidadosos ante las opiniones de los expertos que ante otras opiniones. Y obedecemos a las autoridades, incluso en aquello racional o moralmente no tiene sentido.</a:t>
+            </a:r>
+          </a:p>
+        </p:txBody>
+      </p:sp>
+      <p:sp>
+        <p:nvSpPr>
+          <p:cNvPr id="9" name="CuadroTexto 8">
+            <a:extLst>
+              <a:ext uri="{FF2B5EF4-FFF2-40B4-BE49-F238E27FC236}">
+                <a16:creationId xmlns:a16="http://schemas.microsoft.com/office/drawing/2014/main" id="{E1A81661-328E-45B6-9ED4-2E0B1FB4293E}"/>
+              </a:ext>
+            </a:extLst>
+          </p:cNvPr>
+          <p:cNvSpPr txBox="1"/>
+          <p:nvPr/>
+        </p:nvSpPr>
+        <p:spPr>
+          <a:xfrm>
+            <a:off x="6707429" y="5133688"/>
+            <a:ext cx="3083473" cy="430887"/>
+          </a:xfrm>
+          <a:prstGeom prst="rect">
+            <a:avLst/>
+          </a:prstGeom>
+          <a:noFill/>
+        </p:spPr>
+        <p:txBody>
+          <a:bodyPr wrap="square" rtlCol="0">
+            <a:spAutoFit/>
+          </a:bodyPr>
+          <a:lstStyle/>
+          <a:p>
+            <a:r>
+              <a:rPr lang="es-CO" sz="2200" b="1" dirty="0">
+                <a:solidFill>
+                  <a:schemeClr val="accent1"/>
+                </a:solidFill>
+                <a:latin typeface="Arial" panose="020B0604020202020204" pitchFamily="34" charset="0"/>
+                <a:cs typeface="Arial" panose="020B0604020202020204" pitchFamily="34" charset="0"/>
+              </a:rPr>
+              <a:t>Sesgo de autoridad</a:t>
+            </a:r>
+          </a:p>
+        </p:txBody>
+      </p:sp>
+    </p:spTree>
+    <p:extLst>
+      <p:ext uri="{BB962C8B-B14F-4D97-AF65-F5344CB8AC3E}">
+        <p14:creationId xmlns:p14="http://schemas.microsoft.com/office/powerpoint/2010/main" val="265926940"/>
+      </p:ext>
+    </p:extLst>
+  </p:cSld>
+  <p:clrMapOvr>
+    <a:masterClrMapping/>
+  </p:clrMapOvr>
+</p:sld>
+</file>
+
+<file path=ppt/slides/slide19.xml><?xml version="1.0" encoding="utf-8"?>
+<p:sld xmlns:a="http://schemas.openxmlformats.org/drawingml/2006/main" xmlns:r="http://schemas.openxmlformats.org/officeDocument/2006/relationships" xmlns:p="http://schemas.openxmlformats.org/presentationml/2006/main">
+  <p:cSld>
+    <p:spTree>
+      <p:nvGrpSpPr>
+        <p:cNvPr id="1" name=""/>
+        <p:cNvGrpSpPr/>
+        <p:nvPr/>
+      </p:nvGrpSpPr>
+      <p:grpSpPr>
+        <a:xfrm>
+          <a:off x="0" y="0"/>
+          <a:ext cx="0" cy="0"/>
+          <a:chOff x="0" y="0"/>
+          <a:chExt cx="0" cy="0"/>
+        </a:xfrm>
+      </p:grpSpPr>
+      <p:pic>
+        <p:nvPicPr>
+          <p:cNvPr id="21" name="Imagen 20">
+            <a:extLst>
+              <a:ext uri="{FF2B5EF4-FFF2-40B4-BE49-F238E27FC236}">
+                <a16:creationId xmlns:a16="http://schemas.microsoft.com/office/drawing/2014/main" id="{F0ECDF9F-21EA-4E76-AAAD-DDF43417F80C}"/>
+              </a:ext>
+            </a:extLst>
+          </p:cNvPr>
+          <p:cNvPicPr>
+            <a:picLocks noChangeAspect="1"/>
+          </p:cNvPicPr>
+          <p:nvPr/>
+        </p:nvPicPr>
+        <p:blipFill>
+          <a:blip r:embed="rId2"/>
+          <a:stretch>
+            <a:fillRect/>
+          </a:stretch>
+        </p:blipFill>
+        <p:spPr>
+          <a:xfrm>
+            <a:off x="3216862" y="3150168"/>
+            <a:ext cx="205029" cy="173485"/>
+          </a:xfrm>
+          <a:prstGeom prst="rect">
+            <a:avLst/>
+          </a:prstGeom>
+        </p:spPr>
+      </p:pic>
+      <p:sp>
+        <p:nvSpPr>
+          <p:cNvPr id="14" name="CuadroTexto 13">
+            <a:extLst>
+              <a:ext uri="{FF2B5EF4-FFF2-40B4-BE49-F238E27FC236}">
+                <a16:creationId xmlns:a16="http://schemas.microsoft.com/office/drawing/2014/main" id="{3E764585-5CEC-4D97-93DF-03FFBF2E05B4}"/>
+              </a:ext>
+            </a:extLst>
+          </p:cNvPr>
+          <p:cNvSpPr txBox="1"/>
+          <p:nvPr/>
+        </p:nvSpPr>
+        <p:spPr>
+          <a:xfrm>
+            <a:off x="5283267" y="6127076"/>
+            <a:ext cx="4001668" cy="338554"/>
+          </a:xfrm>
+          <a:prstGeom prst="rect">
+            <a:avLst/>
+          </a:prstGeom>
+          <a:noFill/>
+        </p:spPr>
+        <p:txBody>
+          <a:bodyPr wrap="square">
+            <a:spAutoFit/>
+          </a:bodyPr>
+          <a:lstStyle/>
+          <a:p>
+            <a:r>
+              <a:rPr lang="es-ES" sz="1600" dirty="0">
+                <a:solidFill>
+                  <a:schemeClr val="tx1">
+                    <a:lumMod val="85000"/>
+                    <a:lumOff val="15000"/>
+                  </a:schemeClr>
+                </a:solidFill>
+                <a:latin typeface="Cambria Math" panose="02040503050406030204" pitchFamily="18" charset="0"/>
+                <a:ea typeface="Cambria Math" panose="02040503050406030204" pitchFamily="18" charset="0"/>
+              </a:rPr>
+              <a:t>Créditos: Los innovadores – Walter Isaacson</a:t>
+            </a:r>
+            <a:endParaRPr lang="es-ES" sz="1600" b="1" dirty="0">
+              <a:solidFill>
+                <a:schemeClr val="tx1">
+                  <a:lumMod val="85000"/>
+                  <a:lumOff val="15000"/>
+                </a:schemeClr>
+              </a:solidFill>
+              <a:latin typeface="Cambria Math" panose="02040503050406030204" pitchFamily="18" charset="0"/>
+              <a:ea typeface="Cambria Math" panose="02040503050406030204" pitchFamily="18" charset="0"/>
+            </a:endParaRPr>
+          </a:p>
+        </p:txBody>
+      </p:sp>
+    </p:spTree>
+    <p:extLst>
+      <p:ext uri="{BB962C8B-B14F-4D97-AF65-F5344CB8AC3E}">
+        <p14:creationId xmlns:p14="http://schemas.microsoft.com/office/powerpoint/2010/main" val="2225869612"/>
       </p:ext>
     </p:extLst>
   </p:cSld>
@@ -2371,6 +4632,566 @@
 </p:sld>
 </file>
 
+<file path=ppt/slides/slide20.xml><?xml version="1.0" encoding="utf-8"?>
+<p:sld xmlns:a="http://schemas.openxmlformats.org/drawingml/2006/main" xmlns:r="http://schemas.openxmlformats.org/officeDocument/2006/relationships" xmlns:p="http://schemas.openxmlformats.org/presentationml/2006/main">
+  <p:cSld>
+    <p:spTree>
+      <p:nvGrpSpPr>
+        <p:cNvPr id="1" name=""/>
+        <p:cNvGrpSpPr/>
+        <p:nvPr/>
+      </p:nvGrpSpPr>
+      <p:grpSpPr>
+        <a:xfrm>
+          <a:off x="0" y="0"/>
+          <a:ext cx="0" cy="0"/>
+          <a:chOff x="0" y="0"/>
+          <a:chExt cx="0" cy="0"/>
+        </a:xfrm>
+      </p:grpSpPr>
+      <p:pic>
+        <p:nvPicPr>
+          <p:cNvPr id="21" name="Imagen 20">
+            <a:extLst>
+              <a:ext uri="{FF2B5EF4-FFF2-40B4-BE49-F238E27FC236}">
+                <a16:creationId xmlns:a16="http://schemas.microsoft.com/office/drawing/2014/main" id="{F0ECDF9F-21EA-4E76-AAAD-DDF43417F80C}"/>
+              </a:ext>
+            </a:extLst>
+          </p:cNvPr>
+          <p:cNvPicPr>
+            <a:picLocks noChangeAspect="1"/>
+          </p:cNvPicPr>
+          <p:nvPr/>
+        </p:nvPicPr>
+        <p:blipFill>
+          <a:blip r:embed="rId2"/>
+          <a:stretch>
+            <a:fillRect/>
+          </a:stretch>
+        </p:blipFill>
+        <p:spPr>
+          <a:xfrm>
+            <a:off x="3216862" y="3150168"/>
+            <a:ext cx="205029" cy="173485"/>
+          </a:xfrm>
+          <a:prstGeom prst="rect">
+            <a:avLst/>
+          </a:prstGeom>
+        </p:spPr>
+      </p:pic>
+      <p:sp>
+        <p:nvSpPr>
+          <p:cNvPr id="14" name="CuadroTexto 13">
+            <a:extLst>
+              <a:ext uri="{FF2B5EF4-FFF2-40B4-BE49-F238E27FC236}">
+                <a16:creationId xmlns:a16="http://schemas.microsoft.com/office/drawing/2014/main" id="{3E764585-5CEC-4D97-93DF-03FFBF2E05B4}"/>
+              </a:ext>
+            </a:extLst>
+          </p:cNvPr>
+          <p:cNvSpPr txBox="1"/>
+          <p:nvPr/>
+        </p:nvSpPr>
+        <p:spPr>
+          <a:xfrm>
+            <a:off x="5283267" y="6127076"/>
+            <a:ext cx="4001668" cy="338554"/>
+          </a:xfrm>
+          <a:prstGeom prst="rect">
+            <a:avLst/>
+          </a:prstGeom>
+          <a:noFill/>
+        </p:spPr>
+        <p:txBody>
+          <a:bodyPr wrap="square">
+            <a:spAutoFit/>
+          </a:bodyPr>
+          <a:lstStyle/>
+          <a:p>
+            <a:r>
+              <a:rPr lang="es-ES" sz="1600" dirty="0">
+                <a:solidFill>
+                  <a:schemeClr val="tx1">
+                    <a:lumMod val="85000"/>
+                    <a:lumOff val="15000"/>
+                  </a:schemeClr>
+                </a:solidFill>
+                <a:latin typeface="Cambria Math" panose="02040503050406030204" pitchFamily="18" charset="0"/>
+                <a:ea typeface="Cambria Math" panose="02040503050406030204" pitchFamily="18" charset="0"/>
+              </a:rPr>
+              <a:t>Créditos: Los innovadores – Walter Isaacson</a:t>
+            </a:r>
+            <a:endParaRPr lang="es-ES" sz="1600" b="1" dirty="0">
+              <a:solidFill>
+                <a:schemeClr val="tx1">
+                  <a:lumMod val="85000"/>
+                  <a:lumOff val="15000"/>
+                </a:schemeClr>
+              </a:solidFill>
+              <a:latin typeface="Cambria Math" panose="02040503050406030204" pitchFamily="18" charset="0"/>
+              <a:ea typeface="Cambria Math" panose="02040503050406030204" pitchFamily="18" charset="0"/>
+            </a:endParaRPr>
+          </a:p>
+        </p:txBody>
+      </p:sp>
+    </p:spTree>
+    <p:extLst>
+      <p:ext uri="{BB962C8B-B14F-4D97-AF65-F5344CB8AC3E}">
+        <p14:creationId xmlns:p14="http://schemas.microsoft.com/office/powerpoint/2010/main" val="2897333965"/>
+      </p:ext>
+    </p:extLst>
+  </p:cSld>
+  <p:clrMapOvr>
+    <a:masterClrMapping/>
+  </p:clrMapOvr>
+</p:sld>
+</file>
+
+<file path=ppt/slides/slide21.xml><?xml version="1.0" encoding="utf-8"?>
+<p:sld xmlns:a="http://schemas.openxmlformats.org/drawingml/2006/main" xmlns:r="http://schemas.openxmlformats.org/officeDocument/2006/relationships" xmlns:p="http://schemas.openxmlformats.org/presentationml/2006/main">
+  <p:cSld>
+    <p:spTree>
+      <p:nvGrpSpPr>
+        <p:cNvPr id="1" name=""/>
+        <p:cNvGrpSpPr/>
+        <p:nvPr/>
+      </p:nvGrpSpPr>
+      <p:grpSpPr>
+        <a:xfrm>
+          <a:off x="0" y="0"/>
+          <a:ext cx="0" cy="0"/>
+          <a:chOff x="0" y="0"/>
+          <a:chExt cx="0" cy="0"/>
+        </a:xfrm>
+      </p:grpSpPr>
+      <p:pic>
+        <p:nvPicPr>
+          <p:cNvPr id="3" name="Imagen 2">
+            <a:extLst>
+              <a:ext uri="{FF2B5EF4-FFF2-40B4-BE49-F238E27FC236}">
+                <a16:creationId xmlns:a16="http://schemas.microsoft.com/office/drawing/2014/main" id="{E20F7241-857B-DE46-B3E2-EE0DFE01E99C}"/>
+              </a:ext>
+            </a:extLst>
+          </p:cNvPr>
+          <p:cNvPicPr>
+            <a:picLocks noChangeAspect="1"/>
+          </p:cNvPicPr>
+          <p:nvPr/>
+        </p:nvPicPr>
+        <p:blipFill>
+          <a:blip r:embed="rId2"/>
+          <a:stretch>
+            <a:fillRect/>
+          </a:stretch>
+        </p:blipFill>
+        <p:spPr>
+          <a:xfrm rot="5400000">
+            <a:off x="4911185" y="893468"/>
+            <a:ext cx="205029" cy="173485"/>
+          </a:xfrm>
+          <a:prstGeom prst="rect">
+            <a:avLst/>
+          </a:prstGeom>
+        </p:spPr>
+      </p:pic>
+      <p:sp>
+        <p:nvSpPr>
+          <p:cNvPr id="12" name="CuadroTexto 11">
+            <a:extLst>
+              <a:ext uri="{FF2B5EF4-FFF2-40B4-BE49-F238E27FC236}">
+                <a16:creationId xmlns:a16="http://schemas.microsoft.com/office/drawing/2014/main" id="{DE1BFC59-8522-4823-A644-126DB6DF8625}"/>
+              </a:ext>
+            </a:extLst>
+          </p:cNvPr>
+          <p:cNvSpPr txBox="1"/>
+          <p:nvPr/>
+        </p:nvSpPr>
+        <p:spPr>
+          <a:xfrm>
+            <a:off x="2396282" y="-1988697"/>
+            <a:ext cx="1034522" cy="9248686"/>
+          </a:xfrm>
+          <a:prstGeom prst="rect">
+            <a:avLst/>
+          </a:prstGeom>
+          <a:noFill/>
+        </p:spPr>
+        <p:txBody>
+          <a:bodyPr wrap="square" rtlCol="0">
+            <a:spAutoFit/>
+          </a:bodyPr>
+          <a:lstStyle/>
+          <a:p>
+            <a:r>
+              <a:rPr lang="es-CO" sz="59500" b="1" dirty="0">
+                <a:ln w="19050">
+                  <a:solidFill>
+                    <a:srgbClr val="E83566"/>
+                  </a:solidFill>
+                </a:ln>
+                <a:noFill/>
+                <a:latin typeface="Arial" panose="020B0604020202020204" pitchFamily="34" charset="0"/>
+                <a:cs typeface="Arial" panose="020B0604020202020204" pitchFamily="34" charset="0"/>
+              </a:rPr>
+              <a:t>V</a:t>
+            </a:r>
+          </a:p>
+        </p:txBody>
+      </p:sp>
+      <p:pic>
+        <p:nvPicPr>
+          <p:cNvPr id="5" name="Imagen 4">
+            <a:extLst>
+              <a:ext uri="{FF2B5EF4-FFF2-40B4-BE49-F238E27FC236}">
+                <a16:creationId xmlns:a16="http://schemas.microsoft.com/office/drawing/2014/main" id="{384C26ED-F65D-5D41-8438-47B783421CE5}"/>
+              </a:ext>
+            </a:extLst>
+          </p:cNvPr>
+          <p:cNvPicPr>
+            <a:picLocks noChangeAspect="1"/>
+          </p:cNvPicPr>
+          <p:nvPr/>
+        </p:nvPicPr>
+        <p:blipFill>
+          <a:blip r:embed="rId3"/>
+          <a:stretch>
+            <a:fillRect/>
+          </a:stretch>
+        </p:blipFill>
+        <p:spPr>
+          <a:xfrm>
+            <a:off x="846235" y="6171028"/>
+            <a:ext cx="571500" cy="152400"/>
+          </a:xfrm>
+          <a:prstGeom prst="rect">
+            <a:avLst/>
+          </a:prstGeom>
+        </p:spPr>
+      </p:pic>
+      <p:sp>
+        <p:nvSpPr>
+          <p:cNvPr id="14" name="CuadroTexto 13">
+            <a:extLst>
+              <a:ext uri="{FF2B5EF4-FFF2-40B4-BE49-F238E27FC236}">
+                <a16:creationId xmlns:a16="http://schemas.microsoft.com/office/drawing/2014/main" id="{5D3F11D2-D3D3-4D6A-A426-567CD1B6E0D8}"/>
+              </a:ext>
+            </a:extLst>
+          </p:cNvPr>
+          <p:cNvSpPr txBox="1"/>
+          <p:nvPr/>
+        </p:nvSpPr>
+        <p:spPr>
+          <a:xfrm>
+            <a:off x="5385872" y="1444401"/>
+            <a:ext cx="3329149" cy="2554545"/>
+          </a:xfrm>
+          <a:prstGeom prst="rect">
+            <a:avLst/>
+          </a:prstGeom>
+          <a:noFill/>
+        </p:spPr>
+        <p:txBody>
+          <a:bodyPr wrap="square" rtlCol="0">
+            <a:spAutoFit/>
+          </a:bodyPr>
+          <a:lstStyle/>
+          <a:p>
+            <a:r>
+              <a:rPr lang="es-CO" sz="4000" b="1" dirty="0">
+                <a:solidFill>
+                  <a:schemeClr val="accent1"/>
+                </a:solidFill>
+                <a:latin typeface="Arial" panose="020B0604020202020204" pitchFamily="34" charset="0"/>
+                <a:cs typeface="Arial" panose="020B0604020202020204" pitchFamily="34" charset="0"/>
+              </a:rPr>
+              <a:t>Vísteme despacio que tengo prisa</a:t>
+            </a:r>
+          </a:p>
+        </p:txBody>
+      </p:sp>
+      <p:sp>
+        <p:nvSpPr>
+          <p:cNvPr id="15" name="CuadroTexto 14">
+            <a:extLst>
+              <a:ext uri="{FF2B5EF4-FFF2-40B4-BE49-F238E27FC236}">
+                <a16:creationId xmlns:a16="http://schemas.microsoft.com/office/drawing/2014/main" id="{9614F4AF-E1D5-43C5-876F-CA4497D0EA8C}"/>
+              </a:ext>
+            </a:extLst>
+          </p:cNvPr>
+          <p:cNvSpPr txBox="1"/>
+          <p:nvPr/>
+        </p:nvSpPr>
+        <p:spPr>
+          <a:xfrm>
+            <a:off x="6596595" y="468684"/>
+            <a:ext cx="940482" cy="5276410"/>
+          </a:xfrm>
+          <a:prstGeom prst="rect">
+            <a:avLst/>
+          </a:prstGeom>
+          <a:noFill/>
+        </p:spPr>
+        <p:txBody>
+          <a:bodyPr wrap="square" rtlCol="0">
+            <a:spAutoFit/>
+          </a:bodyPr>
+          <a:lstStyle/>
+          <a:p>
+            <a:r>
+              <a:rPr lang="es-CO" sz="49600" b="1" dirty="0">
+                <a:ln w="19050">
+                  <a:solidFill>
+                    <a:srgbClr val="5C739C"/>
+                  </a:solidFill>
+                </a:ln>
+                <a:noFill/>
+                <a:latin typeface="Arial" panose="020B0604020202020204" pitchFamily="34" charset="0"/>
+                <a:cs typeface="Arial" panose="020B0604020202020204" pitchFamily="34" charset="0"/>
+              </a:rPr>
+              <a:t>A</a:t>
+            </a:r>
+          </a:p>
+        </p:txBody>
+      </p:sp>
+      <p:sp>
+        <p:nvSpPr>
+          <p:cNvPr id="16" name="CuadroTexto 15">
+            <a:extLst>
+              <a:ext uri="{FF2B5EF4-FFF2-40B4-BE49-F238E27FC236}">
+                <a16:creationId xmlns:a16="http://schemas.microsoft.com/office/drawing/2014/main" id="{528026C5-D934-461B-A360-77CF416FBA92}"/>
+              </a:ext>
+            </a:extLst>
+          </p:cNvPr>
+          <p:cNvSpPr txBox="1"/>
+          <p:nvPr/>
+        </p:nvSpPr>
+        <p:spPr>
+          <a:xfrm>
+            <a:off x="9082356" y="2959612"/>
+            <a:ext cx="3329149" cy="1323439"/>
+          </a:xfrm>
+          <a:prstGeom prst="rect">
+            <a:avLst/>
+          </a:prstGeom>
+          <a:noFill/>
+        </p:spPr>
+        <p:txBody>
+          <a:bodyPr wrap="square" rtlCol="0">
+            <a:spAutoFit/>
+          </a:bodyPr>
+          <a:lstStyle/>
+          <a:p>
+            <a:r>
+              <a:rPr lang="es-CO" sz="4000" b="1" dirty="0">
+                <a:ln>
+                  <a:solidFill>
+                    <a:srgbClr val="E83566"/>
+                  </a:solidFill>
+                </a:ln>
+                <a:noFill/>
+                <a:latin typeface="Arial" panose="020B0604020202020204" pitchFamily="34" charset="0"/>
+                <a:cs typeface="Arial" panose="020B0604020202020204" pitchFamily="34" charset="0"/>
+              </a:rPr>
+              <a:t>Apresúrate</a:t>
+            </a:r>
+          </a:p>
+          <a:p>
+            <a:r>
+              <a:rPr lang="es-CO" sz="4000" b="1" dirty="0">
+                <a:ln>
+                  <a:solidFill>
+                    <a:srgbClr val="E83566"/>
+                  </a:solidFill>
+                </a:ln>
+                <a:noFill/>
+                <a:latin typeface="Arial" panose="020B0604020202020204" pitchFamily="34" charset="0"/>
+                <a:cs typeface="Arial" panose="020B0604020202020204" pitchFamily="34" charset="0"/>
+              </a:rPr>
+              <a:t>lentamente</a:t>
+            </a:r>
+          </a:p>
+        </p:txBody>
+      </p:sp>
+      <p:sp>
+        <p:nvSpPr>
+          <p:cNvPr id="18" name="CuadroTexto 17">
+            <a:extLst>
+              <a:ext uri="{FF2B5EF4-FFF2-40B4-BE49-F238E27FC236}">
+                <a16:creationId xmlns:a16="http://schemas.microsoft.com/office/drawing/2014/main" id="{F66E8033-1A02-4265-AF6C-CF9FE730E20E}"/>
+              </a:ext>
+            </a:extLst>
+          </p:cNvPr>
+          <p:cNvSpPr txBox="1"/>
+          <p:nvPr/>
+        </p:nvSpPr>
+        <p:spPr>
+          <a:xfrm>
+            <a:off x="1448520" y="6062562"/>
+            <a:ext cx="8347198" cy="369332"/>
+          </a:xfrm>
+          <a:prstGeom prst="rect">
+            <a:avLst/>
+          </a:prstGeom>
+          <a:noFill/>
+        </p:spPr>
+        <p:txBody>
+          <a:bodyPr wrap="square">
+            <a:spAutoFit/>
+          </a:bodyPr>
+          <a:lstStyle/>
+          <a:p>
+            <a:r>
+              <a:rPr lang="es-CO" dirty="0">
+                <a:solidFill>
+                  <a:schemeClr val="bg2">
+                    <a:lumMod val="50000"/>
+                  </a:schemeClr>
+                </a:solidFill>
+                <a:latin typeface="Arial" panose="020B0604020202020204" pitchFamily="34" charset="0"/>
+                <a:cs typeface="Arial" panose="020B0604020202020204" pitchFamily="34" charset="0"/>
+              </a:rPr>
+              <a:t>“</a:t>
+            </a:r>
+            <a:r>
+              <a:rPr lang="es-ES" dirty="0">
+                <a:solidFill>
+                  <a:schemeClr val="bg2">
+                    <a:lumMod val="50000"/>
+                  </a:schemeClr>
+                </a:solidFill>
+                <a:latin typeface="Arial" panose="020B0604020202020204" pitchFamily="34" charset="0"/>
+                <a:cs typeface="Arial" panose="020B0604020202020204" pitchFamily="34" charset="0"/>
+              </a:rPr>
+              <a:t>Caminad lentamente si queréis llegar más pronto a un trabajo bien hecho”</a:t>
+            </a:r>
+            <a:endParaRPr lang="es-CO" dirty="0">
+              <a:solidFill>
+                <a:schemeClr val="bg2">
+                  <a:lumMod val="50000"/>
+                </a:schemeClr>
+              </a:solidFill>
+              <a:latin typeface="Arial" panose="020B0604020202020204" pitchFamily="34" charset="0"/>
+              <a:cs typeface="Arial" panose="020B0604020202020204" pitchFamily="34" charset="0"/>
+            </a:endParaRPr>
+          </a:p>
+        </p:txBody>
+      </p:sp>
+      <p:sp>
+        <p:nvSpPr>
+          <p:cNvPr id="10" name="CuadroTexto 9">
+            <a:extLst>
+              <a:ext uri="{FF2B5EF4-FFF2-40B4-BE49-F238E27FC236}">
+                <a16:creationId xmlns:a16="http://schemas.microsoft.com/office/drawing/2014/main" id="{D9ACF6AD-C24E-47C7-9A5D-86D7890B7106}"/>
+              </a:ext>
+            </a:extLst>
+          </p:cNvPr>
+          <p:cNvSpPr txBox="1"/>
+          <p:nvPr/>
+        </p:nvSpPr>
+        <p:spPr>
+          <a:xfrm>
+            <a:off x="4856435" y="1082725"/>
+            <a:ext cx="738971" cy="369332"/>
+          </a:xfrm>
+          <a:prstGeom prst="rect">
+            <a:avLst/>
+          </a:prstGeom>
+          <a:noFill/>
+        </p:spPr>
+        <p:txBody>
+          <a:bodyPr wrap="square">
+            <a:spAutoFit/>
+          </a:bodyPr>
+          <a:lstStyle/>
+          <a:p>
+            <a:r>
+              <a:rPr lang="es-ES" dirty="0" err="1">
+                <a:solidFill>
+                  <a:schemeClr val="bg2">
+                    <a:lumMod val="50000"/>
+                  </a:schemeClr>
+                </a:solidFill>
+                <a:latin typeface="Arial" panose="020B0604020202020204" pitchFamily="34" charset="0"/>
+                <a:cs typeface="Arial" panose="020B0604020202020204" pitchFamily="34" charset="0"/>
+              </a:rPr>
+              <a:t>Hack</a:t>
+            </a:r>
+            <a:endParaRPr lang="es-CO" dirty="0"/>
+          </a:p>
+        </p:txBody>
+      </p:sp>
+    </p:spTree>
+    <p:extLst>
+      <p:ext uri="{BB962C8B-B14F-4D97-AF65-F5344CB8AC3E}">
+        <p14:creationId xmlns:p14="http://schemas.microsoft.com/office/powerpoint/2010/main" val="2874538529"/>
+      </p:ext>
+    </p:extLst>
+  </p:cSld>
+  <p:clrMapOvr>
+    <a:masterClrMapping/>
+  </p:clrMapOvr>
+</p:sld>
+</file>
+
+<file path=ppt/slides/slide22.xml><?xml version="1.0" encoding="utf-8"?>
+<p:sld xmlns:a="http://schemas.openxmlformats.org/drawingml/2006/main" xmlns:r="http://schemas.openxmlformats.org/officeDocument/2006/relationships" xmlns:p="http://schemas.openxmlformats.org/presentationml/2006/main">
+  <p:cSld>
+    <p:spTree>
+      <p:nvGrpSpPr>
+        <p:cNvPr id="1" name=""/>
+        <p:cNvGrpSpPr/>
+        <p:nvPr/>
+      </p:nvGrpSpPr>
+      <p:grpSpPr>
+        <a:xfrm>
+          <a:off x="0" y="0"/>
+          <a:ext cx="0" cy="0"/>
+          <a:chOff x="0" y="0"/>
+          <a:chExt cx="0" cy="0"/>
+        </a:xfrm>
+      </p:grpSpPr>
+      <p:pic>
+        <p:nvPicPr>
+          <p:cNvPr id="3" name="Imagen 2" descr="Interfaz de usuario gráfica, Texto, Aplicación&#10;&#10;Descripción generada automáticamente">
+            <a:extLst>
+              <a:ext uri="{FF2B5EF4-FFF2-40B4-BE49-F238E27FC236}">
+                <a16:creationId xmlns:a16="http://schemas.microsoft.com/office/drawing/2014/main" id="{C56FC406-BA5D-CB4E-8D1C-EEA4A245E74A}"/>
+              </a:ext>
+            </a:extLst>
+          </p:cNvPr>
+          <p:cNvPicPr>
+            <a:picLocks noChangeAspect="1"/>
+          </p:cNvPicPr>
+          <p:nvPr/>
+        </p:nvPicPr>
+        <p:blipFill>
+          <a:blip r:embed="rId2"/>
+          <a:stretch>
+            <a:fillRect/>
+          </a:stretch>
+        </p:blipFill>
+        <p:spPr>
+          <a:xfrm>
+            <a:off x="0" y="8306"/>
+            <a:ext cx="12192000" cy="6841388"/>
+          </a:xfrm>
+          <a:prstGeom prst="rect">
+            <a:avLst/>
+          </a:prstGeom>
+        </p:spPr>
+      </p:pic>
+    </p:spTree>
+    <p:extLst>
+      <p:ext uri="{BB962C8B-B14F-4D97-AF65-F5344CB8AC3E}">
+        <p14:creationId xmlns:p14="http://schemas.microsoft.com/office/powerpoint/2010/main" val="4076813880"/>
+      </p:ext>
+    </p:extLst>
+  </p:cSld>
+  <p:clrMapOvr>
+    <a:masterClrMapping/>
+  </p:clrMapOvr>
+</p:sld>
+</file>
+
 <file path=ppt/slides/slide3.xml><?xml version="1.0" encoding="utf-8"?>
 <p:sld xmlns:a="http://schemas.openxmlformats.org/drawingml/2006/main" xmlns:r="http://schemas.openxmlformats.org/officeDocument/2006/relationships" xmlns:p="http://schemas.openxmlformats.org/presentationml/2006/main">
   <p:cSld>
@@ -2654,6 +5475,64 @@
               <a:t>No es una enfermedad mental oficialmente reconocida</a:t>
             </a:r>
             <a:endParaRPr lang="es-CO" dirty="0"/>
+          </a:p>
+        </p:txBody>
+      </p:sp>
+      <p:sp>
+        <p:nvSpPr>
+          <p:cNvPr id="8" name="CuadroTexto 7">
+            <a:extLst>
+              <a:ext uri="{FF2B5EF4-FFF2-40B4-BE49-F238E27FC236}">
+                <a16:creationId xmlns:a16="http://schemas.microsoft.com/office/drawing/2014/main" id="{ECD690AD-2BCB-452B-8724-177C3929FB87}"/>
+              </a:ext>
+            </a:extLst>
+          </p:cNvPr>
+          <p:cNvSpPr txBox="1"/>
+          <p:nvPr/>
+        </p:nvSpPr>
+        <p:spPr>
+          <a:xfrm>
+            <a:off x="5146638" y="2622916"/>
+            <a:ext cx="361244" cy="1446550"/>
+          </a:xfrm>
+          <a:prstGeom prst="rect">
+            <a:avLst/>
+          </a:prstGeom>
+          <a:noFill/>
+        </p:spPr>
+        <p:txBody>
+          <a:bodyPr wrap="square">
+            <a:spAutoFit/>
+          </a:bodyPr>
+          <a:lstStyle/>
+          <a:p>
+            <a:r>
+              <a:rPr lang="es-ES" sz="8800" dirty="0">
+                <a:ln>
+                  <a:solidFill>
+                    <a:schemeClr val="bg2">
+                      <a:lumMod val="25000"/>
+                    </a:schemeClr>
+                  </a:solidFill>
+                </a:ln>
+                <a:noFill/>
+                <a:latin typeface="Arial Black" panose="020B0A04020102020204" pitchFamily="34" charset="0"/>
+                <a:ea typeface="Cambria Math" panose="02040503050406030204" pitchFamily="18" charset="0"/>
+                <a:cs typeface="Arial" panose="020B0604020202020204" pitchFamily="34" charset="0"/>
+              </a:rPr>
+              <a:t>E</a:t>
+            </a:r>
+            <a:endParaRPr lang="es-CO" sz="8800" dirty="0">
+              <a:ln>
+                <a:solidFill>
+                  <a:schemeClr val="bg2">
+                    <a:lumMod val="25000"/>
+                  </a:schemeClr>
+                </a:solidFill>
+              </a:ln>
+              <a:noFill/>
+              <a:latin typeface="Arial Black" panose="020B0A04020102020204" pitchFamily="34" charset="0"/>
+            </a:endParaRPr>
           </a:p>
         </p:txBody>
       </p:sp>
@@ -2703,13 +5582,7 @@
         </p:nvPicPr>
         <p:blipFill>
           <a:blip r:embed="rId2">
-            <a:duotone>
-              <a:prstClr val="black"/>
-              <a:srgbClr val="E83566">
-                <a:tint val="45000"/>
-                <a:satMod val="400000"/>
-              </a:srgbClr>
-            </a:duotone>
+            <a:lum bright="70000" contrast="-70000"/>
           </a:blip>
           <a:stretch>
             <a:fillRect/>
@@ -2717,8 +5590,8 @@
         </p:blipFill>
         <p:spPr>
           <a:xfrm>
-            <a:off x="1988256" y="2585156"/>
-            <a:ext cx="3695700" cy="3695700"/>
+            <a:off x="0" y="0"/>
+            <a:ext cx="6858000" cy="6858000"/>
           </a:xfrm>
           <a:prstGeom prst="rect">
             <a:avLst/>
@@ -2747,7 +5620,7 @@
         </p:blipFill>
         <p:spPr>
           <a:xfrm rot="16200000">
-            <a:off x="5518101" y="3991708"/>
+            <a:off x="5268916" y="4139480"/>
             <a:ext cx="571500" cy="152400"/>
           </a:xfrm>
           <a:prstGeom prst="rect">
@@ -2769,7 +5642,7 @@
         </p:nvSpPr>
         <p:spPr>
           <a:xfrm>
-            <a:off x="1456454" y="64913"/>
+            <a:off x="1346043" y="491062"/>
             <a:ext cx="1785696" cy="7725192"/>
           </a:xfrm>
           <a:prstGeom prst="rect">
@@ -2812,7 +5685,7 @@
         </p:nvSpPr>
         <p:spPr>
           <a:xfrm>
-            <a:off x="4739674" y="4247293"/>
+            <a:off x="5230940" y="4501430"/>
             <a:ext cx="5043807" cy="1015663"/>
           </a:xfrm>
           <a:prstGeom prst="rect">
@@ -2904,7 +5777,7 @@
         </p:nvSpPr>
         <p:spPr>
           <a:xfrm>
-            <a:off x="5836356" y="3513910"/>
+            <a:off x="5554666" y="3625864"/>
             <a:ext cx="3402535" cy="1107996"/>
           </a:xfrm>
           <a:prstGeom prst="rect">

</xml_diff>